<commit_message>
replacing old (corrupt?) files
</commit_message>
<xml_diff>
--- a/Power BI Time Intelligence - Beyond the Basics.pptx
+++ b/Power BI Time Intelligence - Beyond the Basics.pptx
@@ -24,24 +24,24 @@
     <p:sldId id="745" r:id="rId15"/>
     <p:sldId id="744" r:id="rId16"/>
     <p:sldId id="762" r:id="rId17"/>
-    <p:sldId id="764" r:id="rId18"/>
-    <p:sldId id="757" r:id="rId19"/>
-    <p:sldId id="770" r:id="rId20"/>
-    <p:sldId id="771" r:id="rId21"/>
-    <p:sldId id="772" r:id="rId22"/>
-    <p:sldId id="776" r:id="rId23"/>
-    <p:sldId id="777" r:id="rId24"/>
-    <p:sldId id="773" r:id="rId25"/>
-    <p:sldId id="775" r:id="rId26"/>
-    <p:sldId id="778" r:id="rId27"/>
-    <p:sldId id="774" r:id="rId28"/>
-    <p:sldId id="754" r:id="rId29"/>
-    <p:sldId id="752" r:id="rId30"/>
-    <p:sldId id="780" r:id="rId31"/>
-    <p:sldId id="779" r:id="rId32"/>
-    <p:sldId id="758" r:id="rId33"/>
-    <p:sldId id="748" r:id="rId34"/>
-    <p:sldId id="782" r:id="rId35"/>
+    <p:sldId id="757" r:id="rId18"/>
+    <p:sldId id="770" r:id="rId19"/>
+    <p:sldId id="771" r:id="rId20"/>
+    <p:sldId id="772" r:id="rId21"/>
+    <p:sldId id="776" r:id="rId22"/>
+    <p:sldId id="777" r:id="rId23"/>
+    <p:sldId id="773" r:id="rId24"/>
+    <p:sldId id="775" r:id="rId25"/>
+    <p:sldId id="778" r:id="rId26"/>
+    <p:sldId id="774" r:id="rId27"/>
+    <p:sldId id="754" r:id="rId28"/>
+    <p:sldId id="752" r:id="rId29"/>
+    <p:sldId id="780" r:id="rId30"/>
+    <p:sldId id="779" r:id="rId31"/>
+    <p:sldId id="758" r:id="rId32"/>
+    <p:sldId id="748" r:id="rId33"/>
+    <p:sldId id="782" r:id="rId34"/>
+    <p:sldId id="797" r:id="rId35"/>
     <p:sldId id="783" r:id="rId36"/>
     <p:sldId id="784" r:id="rId37"/>
     <p:sldId id="785" r:id="rId38"/>
@@ -51,8 +51,8 @@
     <p:sldId id="790" r:id="rId42"/>
     <p:sldId id="759" r:id="rId43"/>
     <p:sldId id="753" r:id="rId44"/>
-    <p:sldId id="796" r:id="rId45"/>
-    <p:sldId id="791" r:id="rId46"/>
+    <p:sldId id="798" r:id="rId45"/>
+    <p:sldId id="796" r:id="rId46"/>
     <p:sldId id="794" r:id="rId47"/>
     <p:sldId id="795" r:id="rId48"/>
     <p:sldId id="729" r:id="rId49"/>
@@ -276,7 +276,7 @@
           <a:p>
             <a:fld id="{BB920ABC-E11D-42B4-A428-76B2C5BC0052}" type="datetimeFigureOut">
               <a:rPr lang="en-US" smtClean="0"/>
-              <a:t>4/20/2020</a:t>
+              <a:t>5/13/2020</a:t>
             </a:fld>
             <a:endParaRPr lang="en-US" dirty="0"/>
           </a:p>
@@ -453,7 +453,7 @@
           <a:p>
             <a:fld id="{033EED04-A4F0-49ED-B42E-211B56474E8D}" type="datetimeFigureOut">
               <a:rPr lang="en-US" smtClean="0"/>
-              <a:t>4/20/2020</a:t>
+              <a:t>5/13/2020</a:t>
             </a:fld>
             <a:endParaRPr lang="en-US" dirty="0"/>
           </a:p>
@@ -1438,7 +1438,7 @@
             <a:spLocks noGrp="1"/>
           </p:cNvSpPr>
           <p:nvPr>
-            <p:ph type="sldNum" sz="quarter" idx="5"/>
+            <p:ph type="sldNum" sz="quarter" idx="10"/>
           </p:nvPr>
         </p:nvSpPr>
         <p:spPr/>
@@ -1457,7 +1457,7 @@
     </p:spTree>
     <p:extLst>
       <p:ext uri="{BB962C8B-B14F-4D97-AF65-F5344CB8AC3E}">
-        <p14:creationId xmlns:p14="http://schemas.microsoft.com/office/powerpoint/2010/main" val="4177059796"/>
+        <p14:creationId xmlns:p14="http://schemas.microsoft.com/office/powerpoint/2010/main" val="2472556546"/>
       </p:ext>
     </p:extLst>
   </p:cSld>
@@ -1511,7 +1511,10 @@
           <a:bodyPr/>
           <a:lstStyle/>
           <a:p>
-            <a:endParaRPr lang="en-US" dirty="0"/>
+            <a:r>
+              <a:rPr lang="en-US" dirty="0"/>
+              <a:t>Weeks? Semesters? NOPE!</a:t>
+            </a:r>
           </a:p>
         </p:txBody>
       </p:sp>
@@ -1522,7 +1525,7 @@
             <a:spLocks noGrp="1"/>
           </p:cNvSpPr>
           <p:nvPr>
-            <p:ph type="sldNum" sz="quarter" idx="10"/>
+            <p:ph type="sldNum" sz="quarter" idx="5"/>
           </p:nvPr>
         </p:nvSpPr>
         <p:spPr/>
@@ -1541,7 +1544,7 @@
     </p:spTree>
     <p:extLst>
       <p:ext uri="{BB962C8B-B14F-4D97-AF65-F5344CB8AC3E}">
-        <p14:creationId xmlns:p14="http://schemas.microsoft.com/office/powerpoint/2010/main" val="2472556546"/>
+        <p14:creationId xmlns:p14="http://schemas.microsoft.com/office/powerpoint/2010/main" val="543198530"/>
       </p:ext>
     </p:extLst>
   </p:cSld>
@@ -1625,7 +1628,7 @@
     </p:spTree>
     <p:extLst>
       <p:ext uri="{BB962C8B-B14F-4D97-AF65-F5344CB8AC3E}">
-        <p14:creationId xmlns:p14="http://schemas.microsoft.com/office/powerpoint/2010/main" val="543198530"/>
+        <p14:creationId xmlns:p14="http://schemas.microsoft.com/office/powerpoint/2010/main" val="3973102168"/>
       </p:ext>
     </p:extLst>
   </p:cSld>
@@ -1679,7 +1682,128 @@
           <a:bodyPr/>
           <a:lstStyle/>
           <a:p>
+            <a:pPr marL="171450" indent="-171450">
+              <a:buFont typeface="Arial" panose="020B0604020202020204" pitchFamily="34" charset="0"/>
+              <a:buChar char="•"/>
+            </a:pPr>
+            <a:r>
+              <a:rPr lang="en-US" dirty="0"/>
+              <a:t>Create Sales Amt - </a:t>
+            </a:r>
+            <a:r>
+              <a:rPr lang="en-US" dirty="0" err="1"/>
+              <a:t>TotalYTD</a:t>
+            </a:r>
             <a:endParaRPr lang="en-US" dirty="0"/>
+          </a:p>
+          <a:p>
+            <a:pPr marL="171450" indent="-171450">
+              <a:buFont typeface="Arial" panose="020B0604020202020204" pitchFamily="34" charset="0"/>
+              <a:buChar char="•"/>
+            </a:pPr>
+            <a:r>
+              <a:rPr lang="en-US" dirty="0"/>
+              <a:t>Create Sales Amt – </a:t>
+            </a:r>
+            <a:r>
+              <a:rPr lang="en-US" dirty="0" err="1"/>
+              <a:t>PreviousYear</a:t>
+            </a:r>
+            <a:endParaRPr lang="en-US" dirty="0"/>
+          </a:p>
+          <a:p>
+            <a:pPr marL="171450" indent="-171450">
+              <a:buFont typeface="Arial" panose="020B0604020202020204" pitchFamily="34" charset="0"/>
+              <a:buChar char="•"/>
+            </a:pPr>
+            <a:r>
+              <a:rPr lang="en-US" dirty="0"/>
+              <a:t>Create Sales Amt – YoY </a:t>
+            </a:r>
+          </a:p>
+          <a:p>
+            <a:pPr marL="171450" indent="-171450">
+              <a:buFont typeface="Arial" panose="020B0604020202020204" pitchFamily="34" charset="0"/>
+              <a:buChar char="•"/>
+            </a:pPr>
+            <a:r>
+              <a:rPr lang="en-US" dirty="0"/>
+              <a:t>Create Sales Amt – % </a:t>
+            </a:r>
+            <a:r>
+              <a:rPr lang="en-US" dirty="0" err="1"/>
+              <a:t>Chg</a:t>
+            </a:r>
+            <a:endParaRPr lang="en-US" dirty="0"/>
+          </a:p>
+          <a:p>
+            <a:pPr marL="171450" indent="-171450">
+              <a:buFont typeface="Arial" panose="020B0604020202020204" pitchFamily="34" charset="0"/>
+              <a:buChar char="•"/>
+            </a:pPr>
+            <a:r>
+              <a:rPr lang="en-US" dirty="0"/>
+              <a:t>Show debug measures (push off deep explanation until later)</a:t>
+            </a:r>
+          </a:p>
+          <a:p>
+            <a:pPr marL="171450" marR="0" lvl="0" indent="-171450" algn="l" defTabSz="914400" rtl="0" eaLnBrk="1" fontAlgn="auto" latinLnBrk="0" hangingPunct="1">
+              <a:lnSpc>
+                <a:spcPct val="100000"/>
+              </a:lnSpc>
+              <a:spcBef>
+                <a:spcPts val="0"/>
+              </a:spcBef>
+              <a:spcAft>
+                <a:spcPts val="0"/>
+              </a:spcAft>
+              <a:buClrTx/>
+              <a:buSzTx/>
+              <a:buFont typeface="Arial" panose="020B0604020202020204" pitchFamily="34" charset="0"/>
+              <a:buChar char="•"/>
+              <a:tabLst/>
+              <a:defRPr/>
+            </a:pPr>
+            <a:r>
+              <a:rPr lang="en-US" dirty="0"/>
+              <a:t>Create Sales Amt – </a:t>
+            </a:r>
+            <a:r>
+              <a:rPr lang="en-US" dirty="0" err="1"/>
+              <a:t>PreviousMonth</a:t>
+            </a:r>
+            <a:r>
+              <a:rPr lang="en-US" dirty="0"/>
+              <a:t> / </a:t>
+            </a:r>
+            <a:r>
+              <a:rPr lang="en-US" dirty="0" err="1"/>
+              <a:t>NextMonth</a:t>
+            </a:r>
+            <a:endParaRPr lang="en-US" dirty="0"/>
+          </a:p>
+          <a:p>
+            <a:pPr marL="171450" marR="0" lvl="0" indent="-171450" algn="l" defTabSz="914400" rtl="0" eaLnBrk="1" fontAlgn="auto" latinLnBrk="0" hangingPunct="1">
+              <a:lnSpc>
+                <a:spcPct val="100000"/>
+              </a:lnSpc>
+              <a:spcBef>
+                <a:spcPts val="0"/>
+              </a:spcBef>
+              <a:spcAft>
+                <a:spcPts val="0"/>
+              </a:spcAft>
+              <a:buClrTx/>
+              <a:buSzTx/>
+              <a:buFont typeface="Arial" panose="020B0604020202020204" pitchFamily="34" charset="0"/>
+              <a:buChar char="•"/>
+              <a:tabLst/>
+              <a:defRPr/>
+            </a:pPr>
+            <a:r>
+              <a:rPr lang="en-US" dirty="0"/>
+              <a:t>Create Sales Amt – SPLY </a:t>
+            </a:r>
           </a:p>
         </p:txBody>
       </p:sp>
@@ -1709,7 +1833,7 @@
     </p:spTree>
     <p:extLst>
       <p:ext uri="{BB962C8B-B14F-4D97-AF65-F5344CB8AC3E}">
-        <p14:creationId xmlns:p14="http://schemas.microsoft.com/office/powerpoint/2010/main" val="3973102168"/>
+        <p14:creationId xmlns:p14="http://schemas.microsoft.com/office/powerpoint/2010/main" val="4134122612"/>
       </p:ext>
     </p:extLst>
   </p:cSld>
@@ -1763,127 +1887,9 @@
           <a:bodyPr/>
           <a:lstStyle/>
           <a:p>
-            <a:pPr marL="171450" indent="-171450">
-              <a:buFont typeface="Arial" panose="020B0604020202020204" pitchFamily="34" charset="0"/>
-              <a:buChar char="•"/>
-            </a:pPr>
             <a:r>
               <a:rPr lang="en-US" dirty="0"/>
-              <a:t>Create Sales Amt - </a:t>
-            </a:r>
-            <a:r>
-              <a:rPr lang="en-US" dirty="0" err="1"/>
-              <a:t>TotalYTD</a:t>
-            </a:r>
-            <a:endParaRPr lang="en-US" dirty="0"/>
-          </a:p>
-          <a:p>
-            <a:pPr marL="171450" indent="-171450">
-              <a:buFont typeface="Arial" panose="020B0604020202020204" pitchFamily="34" charset="0"/>
-              <a:buChar char="•"/>
-            </a:pPr>
-            <a:r>
-              <a:rPr lang="en-US" dirty="0"/>
-              <a:t>Create Sales Amt – </a:t>
-            </a:r>
-            <a:r>
-              <a:rPr lang="en-US" dirty="0" err="1"/>
-              <a:t>PreviousYear</a:t>
-            </a:r>
-            <a:endParaRPr lang="en-US" dirty="0"/>
-          </a:p>
-          <a:p>
-            <a:pPr marL="171450" indent="-171450">
-              <a:buFont typeface="Arial" panose="020B0604020202020204" pitchFamily="34" charset="0"/>
-              <a:buChar char="•"/>
-            </a:pPr>
-            <a:r>
-              <a:rPr lang="en-US" dirty="0"/>
-              <a:t>Create Sales Amt – YoY </a:t>
-            </a:r>
-          </a:p>
-          <a:p>
-            <a:pPr marL="171450" indent="-171450">
-              <a:buFont typeface="Arial" panose="020B0604020202020204" pitchFamily="34" charset="0"/>
-              <a:buChar char="•"/>
-            </a:pPr>
-            <a:r>
-              <a:rPr lang="en-US" dirty="0"/>
-              <a:t>Create Sales Amt – % </a:t>
-            </a:r>
-            <a:r>
-              <a:rPr lang="en-US" dirty="0" err="1"/>
-              <a:t>Chg</a:t>
-            </a:r>
-            <a:endParaRPr lang="en-US" dirty="0"/>
-          </a:p>
-          <a:p>
-            <a:pPr marL="171450" indent="-171450">
-              <a:buFont typeface="Arial" panose="020B0604020202020204" pitchFamily="34" charset="0"/>
-              <a:buChar char="•"/>
-            </a:pPr>
-            <a:r>
-              <a:rPr lang="en-US" dirty="0"/>
-              <a:t>Show debug measures (push off deep explanation until later)</a:t>
-            </a:r>
-          </a:p>
-          <a:p>
-            <a:pPr marL="171450" marR="0" lvl="0" indent="-171450" algn="l" defTabSz="914400" rtl="0" eaLnBrk="1" fontAlgn="auto" latinLnBrk="0" hangingPunct="1">
-              <a:lnSpc>
-                <a:spcPct val="100000"/>
-              </a:lnSpc>
-              <a:spcBef>
-                <a:spcPts val="0"/>
-              </a:spcBef>
-              <a:spcAft>
-                <a:spcPts val="0"/>
-              </a:spcAft>
-              <a:buClrTx/>
-              <a:buSzTx/>
-              <a:buFont typeface="Arial" panose="020B0604020202020204" pitchFamily="34" charset="0"/>
-              <a:buChar char="•"/>
-              <a:tabLst/>
-              <a:defRPr/>
-            </a:pPr>
-            <a:r>
-              <a:rPr lang="en-US" dirty="0"/>
-              <a:t>Create Sales Amt – </a:t>
-            </a:r>
-            <a:r>
-              <a:rPr lang="en-US" dirty="0" err="1"/>
-              <a:t>PreviousMonth</a:t>
-            </a:r>
-            <a:r>
-              <a:rPr lang="en-US" dirty="0"/>
-              <a:t> / </a:t>
-            </a:r>
-            <a:r>
-              <a:rPr lang="en-US" dirty="0" err="1"/>
-              <a:t>NextMonth</a:t>
-            </a:r>
-            <a:endParaRPr lang="en-US" dirty="0"/>
-          </a:p>
-          <a:p>
-            <a:pPr marL="171450" marR="0" lvl="0" indent="-171450" algn="l" defTabSz="914400" rtl="0" eaLnBrk="1" fontAlgn="auto" latinLnBrk="0" hangingPunct="1">
-              <a:lnSpc>
-                <a:spcPct val="100000"/>
-              </a:lnSpc>
-              <a:spcBef>
-                <a:spcPts val="0"/>
-              </a:spcBef>
-              <a:spcAft>
-                <a:spcPts val="0"/>
-              </a:spcAft>
-              <a:buClrTx/>
-              <a:buSzTx/>
-              <a:buFont typeface="Arial" panose="020B0604020202020204" pitchFamily="34" charset="0"/>
-              <a:buChar char="•"/>
-              <a:tabLst/>
-              <a:defRPr/>
-            </a:pPr>
-            <a:r>
-              <a:rPr lang="en-US" dirty="0"/>
-              <a:t>Create Sales Amt – SPLY </a:t>
+              <a:t>Dec 2011 MTD</a:t>
             </a:r>
           </a:p>
         </p:txBody>
@@ -1905,7 +1911,7 @@
           <a:p>
             <a:fld id="{7F220CB7-DCA5-4E5B-97F1-300CDD8D2AAB}" type="slidenum">
               <a:rPr lang="en-US" smtClean="0"/>
-              <a:t>18</a:t>
+              <a:t>19</a:t>
             </a:fld>
             <a:endParaRPr lang="en-US" dirty="0"/>
           </a:p>
@@ -1914,7 +1920,7 @@
     </p:spTree>
     <p:extLst>
       <p:ext uri="{BB962C8B-B14F-4D97-AF65-F5344CB8AC3E}">
-        <p14:creationId xmlns:p14="http://schemas.microsoft.com/office/powerpoint/2010/main" val="4134122612"/>
+        <p14:creationId xmlns:p14="http://schemas.microsoft.com/office/powerpoint/2010/main" val="1600616125"/>
       </p:ext>
     </p:extLst>
   </p:cSld>
@@ -1970,7 +1976,7 @@
           <a:p>
             <a:r>
               <a:rPr lang="en-US" dirty="0"/>
-              <a:t>Dec 2011 MTD</a:t>
+              <a:t>Detecting &amp; Manipulating Context</a:t>
             </a:r>
           </a:p>
         </p:txBody>
@@ -1992,7 +1998,7 @@
           <a:p>
             <a:fld id="{7F220CB7-DCA5-4E5B-97F1-300CDD8D2AAB}" type="slidenum">
               <a:rPr lang="en-US" smtClean="0"/>
-              <a:t>20</a:t>
+              <a:t>25</a:t>
             </a:fld>
             <a:endParaRPr lang="en-US" dirty="0"/>
           </a:p>
@@ -2001,7 +2007,7 @@
     </p:spTree>
     <p:extLst>
       <p:ext uri="{BB962C8B-B14F-4D97-AF65-F5344CB8AC3E}">
-        <p14:creationId xmlns:p14="http://schemas.microsoft.com/office/powerpoint/2010/main" val="1600616125"/>
+        <p14:creationId xmlns:p14="http://schemas.microsoft.com/office/powerpoint/2010/main" val="1220064203"/>
       </p:ext>
     </p:extLst>
   </p:cSld>
@@ -2172,7 +2178,7 @@
     </p:spTree>
     <p:extLst>
       <p:ext uri="{BB962C8B-B14F-4D97-AF65-F5344CB8AC3E}">
-        <p14:creationId xmlns:p14="http://schemas.microsoft.com/office/powerpoint/2010/main" val="1220064203"/>
+        <p14:creationId xmlns:p14="http://schemas.microsoft.com/office/powerpoint/2010/main" val="465860973"/>
       </p:ext>
     </p:extLst>
   </p:cSld>
@@ -2226,9 +2232,23 @@
           <a:bodyPr/>
           <a:lstStyle/>
           <a:p>
+            <a:pPr marL="0" indent="0">
+              <a:buFont typeface="Arial" panose="020B0604020202020204" pitchFamily="34" charset="0"/>
+              <a:buNone/>
+            </a:pPr>
             <a:r>
               <a:rPr lang="en-US" dirty="0"/>
-              <a:t>Detecting &amp; Manipulating Context</a:t>
+              <a:t>Build Prior Period measure </a:t>
+            </a:r>
+          </a:p>
+          <a:p>
+            <a:pPr marL="0" indent="0">
+              <a:buFont typeface="Arial" panose="020B0604020202020204" pitchFamily="34" charset="0"/>
+              <a:buNone/>
+            </a:pPr>
+            <a:r>
+              <a:rPr lang="en-US" dirty="0"/>
+              <a:t>discuss context detection</a:t>
             </a:r>
           </a:p>
         </p:txBody>
@@ -2259,7 +2279,7 @@
     </p:spTree>
     <p:extLst>
       <p:ext uri="{BB962C8B-B14F-4D97-AF65-F5344CB8AC3E}">
-        <p14:creationId xmlns:p14="http://schemas.microsoft.com/office/powerpoint/2010/main" val="465860973"/>
+        <p14:creationId xmlns:p14="http://schemas.microsoft.com/office/powerpoint/2010/main" val="3930112074"/>
       </p:ext>
     </p:extLst>
   </p:cSld>
@@ -2313,24 +2333,7 @@
           <a:bodyPr/>
           <a:lstStyle/>
           <a:p>
-            <a:pPr marL="0" indent="0">
-              <a:buFont typeface="Arial" panose="020B0604020202020204" pitchFamily="34" charset="0"/>
-              <a:buNone/>
-            </a:pPr>
-            <a:r>
-              <a:rPr lang="en-US" dirty="0"/>
-              <a:t>Build Prior Period measure </a:t>
-            </a:r>
-          </a:p>
-          <a:p>
-            <a:pPr marL="0" indent="0">
-              <a:buFont typeface="Arial" panose="020B0604020202020204" pitchFamily="34" charset="0"/>
-              <a:buNone/>
-            </a:pPr>
-            <a:r>
-              <a:rPr lang="en-US" dirty="0"/>
-              <a:t>discuss context detection</a:t>
-            </a:r>
+            <a:endParaRPr lang="en-US" dirty="0"/>
           </a:p>
         </p:txBody>
       </p:sp>
@@ -2341,7 +2344,7 @@
             <a:spLocks noGrp="1"/>
           </p:cNvSpPr>
           <p:nvPr>
-            <p:ph type="sldNum" sz="quarter" idx="5"/>
+            <p:ph type="sldNum" sz="quarter" idx="10"/>
           </p:nvPr>
         </p:nvSpPr>
         <p:spPr/>
@@ -2360,7 +2363,7 @@
     </p:spTree>
     <p:extLst>
       <p:ext uri="{BB962C8B-B14F-4D97-AF65-F5344CB8AC3E}">
-        <p14:creationId xmlns:p14="http://schemas.microsoft.com/office/powerpoint/2010/main" val="3930112074"/>
+        <p14:creationId xmlns:p14="http://schemas.microsoft.com/office/powerpoint/2010/main" val="854784391"/>
       </p:ext>
     </p:extLst>
   </p:cSld>
@@ -2414,7 +2417,10 @@
           <a:bodyPr/>
           <a:lstStyle/>
           <a:p>
-            <a:endParaRPr lang="en-US" dirty="0"/>
+            <a:r>
+              <a:rPr lang="en-US" dirty="0"/>
+              <a:t>Focus on Evaluation Context</a:t>
+            </a:r>
           </a:p>
         </p:txBody>
       </p:sp>
@@ -2425,7 +2431,7 @@
             <a:spLocks noGrp="1"/>
           </p:cNvSpPr>
           <p:nvPr>
-            <p:ph type="sldNum" sz="quarter" idx="10"/>
+            <p:ph type="sldNum" sz="quarter" idx="5"/>
           </p:nvPr>
         </p:nvSpPr>
         <p:spPr/>
@@ -2435,7 +2441,7 @@
           <a:p>
             <a:fld id="{7F220CB7-DCA5-4E5B-97F1-300CDD8D2AAB}" type="slidenum">
               <a:rPr lang="en-US" smtClean="0"/>
-              <a:t>29</a:t>
+              <a:t>30</a:t>
             </a:fld>
             <a:endParaRPr lang="en-US" dirty="0"/>
           </a:p>
@@ -2444,7 +2450,7 @@
     </p:spTree>
     <p:extLst>
       <p:ext uri="{BB962C8B-B14F-4D97-AF65-F5344CB8AC3E}">
-        <p14:creationId xmlns:p14="http://schemas.microsoft.com/office/powerpoint/2010/main" val="854784391"/>
+        <p14:creationId xmlns:p14="http://schemas.microsoft.com/office/powerpoint/2010/main" val="1885089687"/>
       </p:ext>
     </p:extLst>
   </p:cSld>
@@ -2531,7 +2537,7 @@
     </p:spTree>
     <p:extLst>
       <p:ext uri="{BB962C8B-B14F-4D97-AF65-F5344CB8AC3E}">
-        <p14:creationId xmlns:p14="http://schemas.microsoft.com/office/powerpoint/2010/main" val="1885089687"/>
+        <p14:creationId xmlns:p14="http://schemas.microsoft.com/office/powerpoint/2010/main" val="912594454"/>
       </p:ext>
     </p:extLst>
   </p:cSld>
@@ -3387,14 +3393,7 @@
           <a:bodyPr/>
           <a:lstStyle/>
           <a:p>
-            <a:pPr marL="0" indent="0">
-              <a:buFont typeface="Arial" panose="020B0604020202020204" pitchFamily="34" charset="0"/>
-              <a:buNone/>
-            </a:pPr>
-            <a:r>
-              <a:rPr lang="en-US" dirty="0"/>
-              <a:t>Revisiting Prior Year &amp; YTD</a:t>
-            </a:r>
+            <a:endParaRPr lang="en-US" dirty="0"/>
           </a:p>
         </p:txBody>
       </p:sp>
@@ -3424,7 +3423,7 @@
     </p:spTree>
     <p:extLst>
       <p:ext uri="{BB962C8B-B14F-4D97-AF65-F5344CB8AC3E}">
-        <p14:creationId xmlns:p14="http://schemas.microsoft.com/office/powerpoint/2010/main" val="1049352940"/>
+        <p14:creationId xmlns:p14="http://schemas.microsoft.com/office/powerpoint/2010/main" val="1967929861"/>
       </p:ext>
     </p:extLst>
   </p:cSld>
@@ -3478,7 +3477,14 @@
           <a:bodyPr/>
           <a:lstStyle/>
           <a:p>
-            <a:endParaRPr lang="en-US" dirty="0"/>
+            <a:pPr marL="0" indent="0">
+              <a:buFont typeface="Arial" panose="020B0604020202020204" pitchFamily="34" charset="0"/>
+              <a:buNone/>
+            </a:pPr>
+            <a:r>
+              <a:rPr lang="en-US" dirty="0"/>
+              <a:t>Revisiting Prior Year &amp; YTD</a:t>
+            </a:r>
           </a:p>
         </p:txBody>
       </p:sp>
@@ -3508,7 +3514,7 @@
     </p:spTree>
     <p:extLst>
       <p:ext uri="{BB962C8B-B14F-4D97-AF65-F5344CB8AC3E}">
-        <p14:creationId xmlns:p14="http://schemas.microsoft.com/office/powerpoint/2010/main" val="1611319578"/>
+        <p14:creationId xmlns:p14="http://schemas.microsoft.com/office/powerpoint/2010/main" val="1049352940"/>
       </p:ext>
     </p:extLst>
   </p:cSld>
@@ -5358,43 +5364,6 @@
           </a:p>
         </p:txBody>
       </p:sp>
-      <p:sp>
-        <p:nvSpPr>
-          <p:cNvPr id="23" name="TextBox 22"/>
-          <p:cNvSpPr txBox="1"/>
-          <p:nvPr/>
-        </p:nvSpPr>
-        <p:spPr>
-          <a:xfrm>
-            <a:off x="5061709" y="6034711"/>
-            <a:ext cx="2068580" cy="338554"/>
-          </a:xfrm>
-          <a:prstGeom prst="rect">
-            <a:avLst/>
-          </a:prstGeom>
-          <a:noFill/>
-        </p:spPr>
-        <p:txBody>
-          <a:bodyPr wrap="none" rtlCol="0">
-            <a:spAutoFit/>
-          </a:bodyPr>
-          <a:lstStyle/>
-          <a:p>
-            <a:pPr algn="ctr"/>
-            <a:r>
-              <a:rPr lang="en-US" sz="1600" spc="600" dirty="0">
-                <a:solidFill>
-                  <a:srgbClr val="1C1E26"/>
-                </a:solidFill>
-                <a:latin typeface="Lato" panose="020F0502020204030203" pitchFamily="34" charset="0"/>
-                <a:ea typeface="Lato" panose="020F0502020204030203" pitchFamily="34" charset="0"/>
-                <a:cs typeface="Lato" panose="020F0502020204030203" pitchFamily="34" charset="0"/>
-              </a:rPr>
-              <a:t>BILL ANTON</a:t>
-            </a:r>
-          </a:p>
-        </p:txBody>
-      </p:sp>
       <p:pic>
         <p:nvPicPr>
           <p:cNvPr id="9" name="Picture 8" descr="A picture containing plate&#10;&#10;Description automatically generated">
@@ -5490,231 +5459,6 @@
       </p:transition>
     </mc:Fallback>
   </mc:AlternateContent>
-  <p:timing>
-    <p:tnLst>
-      <p:par>
-        <p:cTn id="1" dur="indefinite" restart="never" nodeType="tmRoot">
-          <p:childTnLst>
-            <p:seq concurrent="1" nextAc="seek">
-              <p:cTn id="2" dur="indefinite" nodeType="mainSeq">
-                <p:childTnLst>
-                  <p:par>
-                    <p:cTn id="3" fill="hold">
-                      <p:stCondLst>
-                        <p:cond delay="indefinite"/>
-                        <p:cond evt="onBegin" delay="0">
-                          <p:tn val="2"/>
-                        </p:cond>
-                      </p:stCondLst>
-                      <p:childTnLst>
-                        <p:par>
-                          <p:cTn id="4" fill="hold">
-                            <p:stCondLst>
-                              <p:cond delay="0"/>
-                            </p:stCondLst>
-                            <p:childTnLst>
-                              <p:par>
-                                <p:cTn id="5" presetID="42" presetClass="entr" presetSubtype="0" fill="hold" grpId="0" nodeType="afterEffect">
-                                  <p:stCondLst>
-                                    <p:cond delay="0"/>
-                                  </p:stCondLst>
-                                  <p:childTnLst>
-                                    <p:set>
-                                      <p:cBhvr>
-                                        <p:cTn id="6" dur="1" fill="hold">
-                                          <p:stCondLst>
-                                            <p:cond delay="0"/>
-                                          </p:stCondLst>
-                                        </p:cTn>
-                                        <p:tgtEl>
-                                          <p:spTgt spid="22"/>
-                                        </p:tgtEl>
-                                        <p:attrNameLst>
-                                          <p:attrName>style.visibility</p:attrName>
-                                        </p:attrNameLst>
-                                      </p:cBhvr>
-                                      <p:to>
-                                        <p:strVal val="visible"/>
-                                      </p:to>
-                                    </p:set>
-                                    <p:animEffect transition="in" filter="fade">
-                                      <p:cBhvr>
-                                        <p:cTn id="7" dur="1000"/>
-                                        <p:tgtEl>
-                                          <p:spTgt spid="22"/>
-                                        </p:tgtEl>
-                                      </p:cBhvr>
-                                    </p:animEffect>
-                                    <p:anim calcmode="lin" valueType="num">
-                                      <p:cBhvr>
-                                        <p:cTn id="8" dur="1000" fill="hold"/>
-                                        <p:tgtEl>
-                                          <p:spTgt spid="22"/>
-                                        </p:tgtEl>
-                                        <p:attrNameLst>
-                                          <p:attrName>ppt_x</p:attrName>
-                                        </p:attrNameLst>
-                                      </p:cBhvr>
-                                      <p:tavLst>
-                                        <p:tav tm="0">
-                                          <p:val>
-                                            <p:strVal val="#ppt_x"/>
-                                          </p:val>
-                                        </p:tav>
-                                        <p:tav tm="100000">
-                                          <p:val>
-                                            <p:strVal val="#ppt_x"/>
-                                          </p:val>
-                                        </p:tav>
-                                      </p:tavLst>
-                                    </p:anim>
-                                    <p:anim calcmode="lin" valueType="num">
-                                      <p:cBhvr>
-                                        <p:cTn id="9" dur="1000" fill="hold"/>
-                                        <p:tgtEl>
-                                          <p:spTgt spid="22"/>
-                                        </p:tgtEl>
-                                        <p:attrNameLst>
-                                          <p:attrName>ppt_y</p:attrName>
-                                        </p:attrNameLst>
-                                      </p:cBhvr>
-                                      <p:tavLst>
-                                        <p:tav tm="0">
-                                          <p:val>
-                                            <p:strVal val="#ppt_y+.1"/>
-                                          </p:val>
-                                        </p:tav>
-                                        <p:tav tm="100000">
-                                          <p:val>
-                                            <p:strVal val="#ppt_y"/>
-                                          </p:val>
-                                        </p:tav>
-                                      </p:tavLst>
-                                    </p:anim>
-                                  </p:childTnLst>
-                                </p:cTn>
-                              </p:par>
-                            </p:childTnLst>
-                          </p:cTn>
-                        </p:par>
-                        <p:par>
-                          <p:cTn id="10" fill="hold">
-                            <p:stCondLst>
-                              <p:cond delay="1000"/>
-                            </p:stCondLst>
-                            <p:childTnLst>
-                              <p:par>
-                                <p:cTn id="11" presetID="10" presetClass="entr" presetSubtype="0" fill="hold" grpId="0" nodeType="afterEffect">
-                                  <p:stCondLst>
-                                    <p:cond delay="0"/>
-                                  </p:stCondLst>
-                                  <p:childTnLst>
-                                    <p:set>
-                                      <p:cBhvr>
-                                        <p:cTn id="12" dur="1" fill="hold">
-                                          <p:stCondLst>
-                                            <p:cond delay="0"/>
-                                          </p:stCondLst>
-                                        </p:cTn>
-                                        <p:tgtEl>
-                                          <p:spTgt spid="23"/>
-                                        </p:tgtEl>
-                                        <p:attrNameLst>
-                                          <p:attrName>style.visibility</p:attrName>
-                                        </p:attrNameLst>
-                                      </p:cBhvr>
-                                      <p:to>
-                                        <p:strVal val="visible"/>
-                                      </p:to>
-                                    </p:set>
-                                    <p:animEffect transition="in" filter="fade">
-                                      <p:cBhvr>
-                                        <p:cTn id="13" dur="500"/>
-                                        <p:tgtEl>
-                                          <p:spTgt spid="23"/>
-                                        </p:tgtEl>
-                                      </p:cBhvr>
-                                    </p:animEffect>
-                                  </p:childTnLst>
-                                </p:cTn>
-                              </p:par>
-                            </p:childTnLst>
-                          </p:cTn>
-                        </p:par>
-                        <p:par>
-                          <p:cTn id="14" fill="hold">
-                            <p:stCondLst>
-                              <p:cond delay="1500"/>
-                            </p:stCondLst>
-                            <p:childTnLst>
-                              <p:par>
-                                <p:cTn id="15" presetID="10" presetClass="entr" presetSubtype="0" fill="hold" grpId="0" nodeType="afterEffect">
-                                  <p:stCondLst>
-                                    <p:cond delay="0"/>
-                                  </p:stCondLst>
-                                  <p:childTnLst>
-                                    <p:set>
-                                      <p:cBhvr>
-                                        <p:cTn id="16" dur="1" fill="hold">
-                                          <p:stCondLst>
-                                            <p:cond delay="0"/>
-                                          </p:stCondLst>
-                                        </p:cTn>
-                                        <p:tgtEl>
-                                          <p:spTgt spid="13"/>
-                                        </p:tgtEl>
-                                        <p:attrNameLst>
-                                          <p:attrName>style.visibility</p:attrName>
-                                        </p:attrNameLst>
-                                      </p:cBhvr>
-                                      <p:to>
-                                        <p:strVal val="visible"/>
-                                      </p:to>
-                                    </p:set>
-                                    <p:animEffect transition="in" filter="fade">
-                                      <p:cBhvr>
-                                        <p:cTn id="17" dur="500"/>
-                                        <p:tgtEl>
-                                          <p:spTgt spid="13"/>
-                                        </p:tgtEl>
-                                      </p:cBhvr>
-                                    </p:animEffect>
-                                  </p:childTnLst>
-                                </p:cTn>
-                              </p:par>
-                            </p:childTnLst>
-                          </p:cTn>
-                        </p:par>
-                      </p:childTnLst>
-                    </p:cTn>
-                  </p:par>
-                </p:childTnLst>
-              </p:cTn>
-              <p:prevCondLst>
-                <p:cond evt="onPrev" delay="0">
-                  <p:tgtEl>
-                    <p:sldTgt/>
-                  </p:tgtEl>
-                </p:cond>
-              </p:prevCondLst>
-              <p:nextCondLst>
-                <p:cond evt="onNext" delay="0">
-                  <p:tgtEl>
-                    <p:sldTgt/>
-                  </p:tgtEl>
-                </p:cond>
-              </p:nextCondLst>
-            </p:seq>
-          </p:childTnLst>
-        </p:cTn>
-      </p:par>
-    </p:tnLst>
-    <p:bldLst>
-      <p:bldP spid="22" grpId="0"/>
-      <p:bldP spid="23" grpId="0"/>
-      <p:bldP spid="13" grpId="0"/>
-    </p:bldLst>
-  </p:timing>
 </p:sld>
 </file>
 
@@ -7104,7 +6848,7 @@
                 </a:solidFill>
                 <a:latin typeface="Lato" panose="020F0502020204030203"/>
               </a:rPr>
-              <a:t>Don’t use “Auto date/time”</a:t>
+              <a:t>Required for time-intelligence functions to work</a:t>
             </a:r>
           </a:p>
           <a:p>
@@ -7122,7 +6866,25 @@
                 </a:solidFill>
                 <a:latin typeface="Lato" panose="020F0502020204030203"/>
               </a:rPr>
-              <a:t>Required for time-intelligence functions to work</a:t>
+              <a:t>Time (hours, minutes, </a:t>
+            </a:r>
+            <a:r>
+              <a:rPr lang="en-US" sz="2800" dirty="0" err="1">
+                <a:solidFill>
+                  <a:schemeClr val="tx2"/>
+                </a:solidFill>
+                <a:latin typeface="Lato" panose="020F0502020204030203"/>
+              </a:rPr>
+              <a:t>etc</a:t>
+            </a:r>
+            <a:r>
+              <a:rPr lang="en-US" sz="2800" dirty="0">
+                <a:solidFill>
+                  <a:schemeClr val="tx2"/>
+                </a:solidFill>
+                <a:latin typeface="Lato" panose="020F0502020204030203"/>
+              </a:rPr>
+              <a:t>) should be in a separate table</a:t>
             </a:r>
           </a:p>
           <a:p>
@@ -7667,232 +7429,6 @@
       </p:grpSpPr>
       <p:sp>
         <p:nvSpPr>
-          <p:cNvPr id="2" name="Rectangle 1">
-            <a:extLst>
-              <a:ext uri="{FF2B5EF4-FFF2-40B4-BE49-F238E27FC236}">
-                <a16:creationId xmlns:a16="http://schemas.microsoft.com/office/drawing/2014/main" id="{A676ED06-08B0-4031-B887-0E4A253B700D}"/>
-              </a:ext>
-            </a:extLst>
-          </p:cNvPr>
-          <p:cNvSpPr/>
-          <p:nvPr/>
-        </p:nvSpPr>
-        <p:spPr>
-          <a:xfrm>
-            <a:off x="1" y="0"/>
-            <a:ext cx="12192000" cy="830179"/>
-          </a:xfrm>
-          <a:prstGeom prst="rect">
-            <a:avLst/>
-          </a:prstGeom>
-          <a:ln>
-            <a:noFill/>
-          </a:ln>
-        </p:spPr>
-        <p:style>
-          <a:lnRef idx="2">
-            <a:schemeClr val="accent1">
-              <a:shade val="50000"/>
-            </a:schemeClr>
-          </a:lnRef>
-          <a:fillRef idx="1">
-            <a:schemeClr val="accent1"/>
-          </a:fillRef>
-          <a:effectRef idx="0">
-            <a:schemeClr val="accent1"/>
-          </a:effectRef>
-          <a:fontRef idx="minor">
-            <a:schemeClr val="lt1"/>
-          </a:fontRef>
-        </p:style>
-        <p:txBody>
-          <a:bodyPr rtlCol="0" anchor="ctr"/>
-          <a:lstStyle/>
-          <a:p>
-            <a:pPr algn="ctr"/>
-            <a:endParaRPr lang="en-US"/>
-          </a:p>
-        </p:txBody>
-      </p:sp>
-      <p:sp>
-        <p:nvSpPr>
-          <p:cNvPr id="7" name="TextBox 6">
-            <a:extLst>
-              <a:ext uri="{FF2B5EF4-FFF2-40B4-BE49-F238E27FC236}">
-                <a16:creationId xmlns:a16="http://schemas.microsoft.com/office/drawing/2014/main" id="{6EA4CFBB-F25E-47BC-BEA0-0C324F8B1A2C}"/>
-              </a:ext>
-            </a:extLst>
-          </p:cNvPr>
-          <p:cNvSpPr txBox="1"/>
-          <p:nvPr/>
-        </p:nvSpPr>
-        <p:spPr>
-          <a:xfrm>
-            <a:off x="381000" y="243235"/>
-            <a:ext cx="7547811" cy="486287"/>
-          </a:xfrm>
-          <a:prstGeom prst="rect">
-            <a:avLst/>
-          </a:prstGeom>
-          <a:noFill/>
-        </p:spPr>
-        <p:txBody>
-          <a:bodyPr wrap="square" rtlCol="0">
-            <a:spAutoFit/>
-          </a:bodyPr>
-          <a:lstStyle/>
-          <a:p>
-            <a:pPr>
-              <a:lnSpc>
-                <a:spcPct val="80000"/>
-              </a:lnSpc>
-            </a:pPr>
-            <a:r>
-              <a:rPr lang="en-US" sz="3200" b="1" dirty="0">
-                <a:solidFill>
-                  <a:schemeClr val="tx2"/>
-                </a:solidFill>
-                <a:latin typeface="Lato Black" panose="020F0502020204030203" pitchFamily="34" charset="0"/>
-                <a:ea typeface="Lato Black" panose="020F0502020204030203" pitchFamily="34" charset="0"/>
-                <a:cs typeface="Lato Black" panose="020F0502020204030203" pitchFamily="34" charset="0"/>
-              </a:rPr>
-              <a:t>Date Tables: Organizational Strategy</a:t>
-            </a:r>
-          </a:p>
-        </p:txBody>
-      </p:sp>
-      <p:pic>
-        <p:nvPicPr>
-          <p:cNvPr id="9" name="Picture 8" descr="A picture containing plate&#10;&#10;Description automatically generated">
-            <a:extLst>
-              <a:ext uri="{FF2B5EF4-FFF2-40B4-BE49-F238E27FC236}">
-                <a16:creationId xmlns:a16="http://schemas.microsoft.com/office/drawing/2014/main" id="{52E05F7F-3D77-475F-8B09-8C543FAA21E3}"/>
-              </a:ext>
-            </a:extLst>
-          </p:cNvPr>
-          <p:cNvPicPr>
-            <a:picLocks noChangeAspect="1"/>
-          </p:cNvPicPr>
-          <p:nvPr/>
-        </p:nvPicPr>
-        <p:blipFill>
-          <a:blip r:embed="rId3"/>
-          <a:stretch>
-            <a:fillRect/>
-          </a:stretch>
-        </p:blipFill>
-        <p:spPr>
-          <a:xfrm>
-            <a:off x="11567856" y="171945"/>
-            <a:ext cx="486287" cy="486287"/>
-          </a:xfrm>
-          <a:prstGeom prst="rect">
-            <a:avLst/>
-          </a:prstGeom>
-        </p:spPr>
-      </p:pic>
-      <p:sp>
-        <p:nvSpPr>
-          <p:cNvPr id="6" name="TextBox 5">
-            <a:extLst>
-              <a:ext uri="{FF2B5EF4-FFF2-40B4-BE49-F238E27FC236}">
-                <a16:creationId xmlns:a16="http://schemas.microsoft.com/office/drawing/2014/main" id="{2311AB42-D92A-4A7A-ACB3-26D9551061C5}"/>
-              </a:ext>
-            </a:extLst>
-          </p:cNvPr>
-          <p:cNvSpPr txBox="1"/>
-          <p:nvPr/>
-        </p:nvSpPr>
-        <p:spPr>
-          <a:xfrm>
-            <a:off x="1302656" y="1659285"/>
-            <a:ext cx="9586687" cy="3539430"/>
-          </a:xfrm>
-          <a:prstGeom prst="rect">
-            <a:avLst/>
-          </a:prstGeom>
-          <a:noFill/>
-        </p:spPr>
-        <p:txBody>
-          <a:bodyPr wrap="square" rtlCol="0">
-            <a:spAutoFit/>
-          </a:bodyPr>
-          <a:lstStyle/>
-          <a:p>
-            <a:pPr marL="285750" indent="-285750" fontAlgn="ctr">
-              <a:buFont typeface="Arial" panose="020B0604020202020204" pitchFamily="34" charset="0"/>
-              <a:buChar char="•"/>
-            </a:pPr>
-            <a:r>
-              <a:rPr lang="en-US" sz="2800" dirty="0"/>
-              <a:t>For enterprise solutions, the date table should be well thought out and centralized.</a:t>
-            </a:r>
-          </a:p>
-          <a:p>
-            <a:pPr marL="285750" indent="-285750" fontAlgn="ctr">
-              <a:buFont typeface="Arial" panose="020B0604020202020204" pitchFamily="34" charset="0"/>
-              <a:buChar char="•"/>
-            </a:pPr>
-            <a:endParaRPr lang="en-US" sz="2800" dirty="0"/>
-          </a:p>
-          <a:p>
-            <a:pPr marL="285750" indent="-285750" fontAlgn="ctr">
-              <a:buFont typeface="Arial" panose="020B0604020202020204" pitchFamily="34" charset="0"/>
-              <a:buChar char="•"/>
-            </a:pPr>
-            <a:r>
-              <a:rPr lang="en-US" sz="2800" dirty="0"/>
-              <a:t>Can be generated out of thin air if you don’t have the ability (or patience) to modify the source system.</a:t>
-            </a:r>
-            <a:br>
-              <a:rPr lang="en-US" sz="2800" dirty="0"/>
-            </a:br>
-            <a:endParaRPr lang="en-US" sz="2800" dirty="0"/>
-          </a:p>
-          <a:p>
-            <a:pPr marL="285750" indent="-285750" fontAlgn="ctr">
-              <a:buFont typeface="Arial" panose="020B0604020202020204" pitchFamily="34" charset="0"/>
-              <a:buChar char="•"/>
-            </a:pPr>
-            <a:r>
-              <a:rPr lang="en-US" sz="2800" dirty="0"/>
-              <a:t>Dataflows are great option for centralizing the date table making it easier to standardize across the organization.</a:t>
-            </a:r>
-          </a:p>
-        </p:txBody>
-      </p:sp>
-    </p:spTree>
-    <p:extLst>
-      <p:ext uri="{BB962C8B-B14F-4D97-AF65-F5344CB8AC3E}">
-        <p14:creationId xmlns:p14="http://schemas.microsoft.com/office/powerpoint/2010/main" val="353426458"/>
-      </p:ext>
-    </p:extLst>
-  </p:cSld>
-  <p:clrMapOvr>
-    <a:masterClrMapping/>
-  </p:clrMapOvr>
-</p:sld>
-</file>
-
-<file path=ppt/slides/slide15.xml><?xml version="1.0" encoding="utf-8"?>
-<p:sld xmlns:a="http://schemas.openxmlformats.org/drawingml/2006/main" xmlns:r="http://schemas.openxmlformats.org/officeDocument/2006/relationships" xmlns:p="http://schemas.openxmlformats.org/presentationml/2006/main">
-  <p:cSld>
-    <p:spTree>
-      <p:nvGrpSpPr>
-        <p:cNvPr id="1" name=""/>
-        <p:cNvGrpSpPr/>
-        <p:nvPr/>
-      </p:nvGrpSpPr>
-      <p:grpSpPr>
-        <a:xfrm>
-          <a:off x="0" y="0"/>
-          <a:ext cx="0" cy="0"/>
-          <a:chOff x="0" y="0"/>
-          <a:chExt cx="0" cy="0"/>
-        </a:xfrm>
-      </p:grpSpPr>
-      <p:sp>
-        <p:nvSpPr>
           <p:cNvPr id="5" name="Rectangle 4">
             <a:extLst>
               <a:ext uri="{C183D7F6-B498-43B3-948B-1728B52AA6E4}">
@@ -8097,7 +7633,7 @@
 </p:sld>
 </file>
 
-<file path=ppt/slides/slide16.xml><?xml version="1.0" encoding="utf-8"?>
+<file path=ppt/slides/slide15.xml><?xml version="1.0" encoding="utf-8"?>
 <p:sld xmlns:a="http://schemas.openxmlformats.org/drawingml/2006/main" xmlns:r="http://schemas.openxmlformats.org/officeDocument/2006/relationships" xmlns:p="http://schemas.openxmlformats.org/presentationml/2006/main">
   <p:cSld>
     <p:spTree>
@@ -8225,7 +7761,7 @@
         <p:spPr>
           <a:xfrm>
             <a:off x="949203" y="2037636"/>
-            <a:ext cx="10618653" cy="2597378"/>
+            <a:ext cx="10618653" cy="1951047"/>
           </a:xfrm>
           <a:prstGeom prst="rect">
             <a:avLst/>
@@ -8252,7 +7788,7 @@
                 </a:solidFill>
                 <a:latin typeface="Lato" panose="020F0502020204030203"/>
               </a:rPr>
-              <a:t>Facilitate comparing and aggregating data over time</a:t>
+              <a:t>Support days, months, quarters, and years</a:t>
             </a:r>
           </a:p>
           <a:p>
@@ -8270,7 +7806,7 @@
                 </a:solidFill>
                 <a:latin typeface="Lato" panose="020F0502020204030203"/>
               </a:rPr>
-              <a:t>Support days, months, quarters, and years</a:t>
+              <a:t>Requires a date table</a:t>
             </a:r>
           </a:p>
           <a:p>
@@ -8307,24 +7843,6 @@
                 <a:latin typeface="Lato" panose="020F0502020204030203"/>
               </a:rPr>
               <a:t> built-in Time-Intelligence DAX functions</a:t>
-            </a:r>
-          </a:p>
-          <a:p>
-            <a:pPr marL="285750" indent="-285750">
-              <a:lnSpc>
-                <a:spcPct val="150000"/>
-              </a:lnSpc>
-              <a:buFont typeface="Arial" panose="020B0604020202020204" pitchFamily="34" charset="0"/>
-              <a:buChar char="•"/>
-            </a:pPr>
-            <a:r>
-              <a:rPr lang="en-US" sz="2800" dirty="0">
-                <a:solidFill>
-                  <a:schemeClr val="tx2"/>
-                </a:solidFill>
-                <a:latin typeface="Lato" panose="020F0502020204030203"/>
-              </a:rPr>
-              <a:t>Requires a date table</a:t>
             </a:r>
           </a:p>
         </p:txBody>
@@ -8372,7 +7890,7 @@
 </p:sld>
 </file>
 
-<file path=ppt/slides/slide17.xml><?xml version="1.0" encoding="utf-8"?>
+<file path=ppt/slides/slide16.xml><?xml version="1.0" encoding="utf-8"?>
 <p:sld xmlns:a="http://schemas.openxmlformats.org/drawingml/2006/main" xmlns:r="http://schemas.openxmlformats.org/officeDocument/2006/relationships" xmlns:p="http://schemas.openxmlformats.org/presentationml/2006/main">
   <p:cSld>
     <p:spTree>
@@ -10008,7 +9526,7 @@
 </p:sld>
 </file>
 
-<file path=ppt/slides/slide18.xml><?xml version="1.0" encoding="utf-8"?>
+<file path=ppt/slides/slide17.xml><?xml version="1.0" encoding="utf-8"?>
 <p:sld xmlns:a="http://schemas.openxmlformats.org/drawingml/2006/main" xmlns:r="http://schemas.openxmlformats.org/officeDocument/2006/relationships" xmlns:p="http://schemas.openxmlformats.org/presentationml/2006/main">
   <p:cSld>
     <p:spTree>
@@ -10311,7 +9829,7 @@
 </p:sld>
 </file>
 
-<file path=ppt/slides/slide19.xml><?xml version="1.0" encoding="utf-8"?>
+<file path=ppt/slides/slide18.xml><?xml version="1.0" encoding="utf-8"?>
 <p:sld xmlns:a="http://schemas.openxmlformats.org/drawingml/2006/main" xmlns:r="http://schemas.openxmlformats.org/officeDocument/2006/relationships" xmlns:p="http://schemas.openxmlformats.org/presentationml/2006/main">
   <p:cSld>
     <p:spTree>
@@ -10674,6 +10192,506 @@
   <p:clrMapOvr>
     <a:masterClrMapping/>
   </p:clrMapOvr>
+</p:sld>
+</file>
+
+<file path=ppt/slides/slide19.xml><?xml version="1.0" encoding="utf-8"?>
+<p:sld xmlns:a="http://schemas.openxmlformats.org/drawingml/2006/main" xmlns:r="http://schemas.openxmlformats.org/officeDocument/2006/relationships" xmlns:p="http://schemas.openxmlformats.org/presentationml/2006/main">
+  <p:cSld>
+    <p:spTree>
+      <p:nvGrpSpPr>
+        <p:cNvPr id="1" name=""/>
+        <p:cNvGrpSpPr/>
+        <p:nvPr/>
+      </p:nvGrpSpPr>
+      <p:grpSpPr>
+        <a:xfrm>
+          <a:off x="0" y="0"/>
+          <a:ext cx="0" cy="0"/>
+          <a:chOff x="0" y="0"/>
+          <a:chExt cx="0" cy="0"/>
+        </a:xfrm>
+      </p:grpSpPr>
+      <p:sp>
+        <p:nvSpPr>
+          <p:cNvPr id="2" name="Rectangle 1">
+            <a:extLst>
+              <a:ext uri="{FF2B5EF4-FFF2-40B4-BE49-F238E27FC236}">
+                <a16:creationId xmlns:a16="http://schemas.microsoft.com/office/drawing/2014/main" id="{A676ED06-08B0-4031-B887-0E4A253B700D}"/>
+              </a:ext>
+            </a:extLst>
+          </p:cNvPr>
+          <p:cNvSpPr/>
+          <p:nvPr/>
+        </p:nvSpPr>
+        <p:spPr>
+          <a:xfrm>
+            <a:off x="1" y="0"/>
+            <a:ext cx="12192000" cy="830179"/>
+          </a:xfrm>
+          <a:prstGeom prst="rect">
+            <a:avLst/>
+          </a:prstGeom>
+          <a:ln>
+            <a:noFill/>
+          </a:ln>
+        </p:spPr>
+        <p:style>
+          <a:lnRef idx="2">
+            <a:schemeClr val="accent1">
+              <a:shade val="50000"/>
+            </a:schemeClr>
+          </a:lnRef>
+          <a:fillRef idx="1">
+            <a:schemeClr val="accent1"/>
+          </a:fillRef>
+          <a:effectRef idx="0">
+            <a:schemeClr val="accent1"/>
+          </a:effectRef>
+          <a:fontRef idx="minor">
+            <a:schemeClr val="lt1"/>
+          </a:fontRef>
+        </p:style>
+        <p:txBody>
+          <a:bodyPr rtlCol="0" anchor="ctr"/>
+          <a:lstStyle/>
+          <a:p>
+            <a:pPr algn="ctr"/>
+            <a:endParaRPr lang="en-US"/>
+          </a:p>
+        </p:txBody>
+      </p:sp>
+      <p:sp>
+        <p:nvSpPr>
+          <p:cNvPr id="7" name="TextBox 6">
+            <a:extLst>
+              <a:ext uri="{FF2B5EF4-FFF2-40B4-BE49-F238E27FC236}">
+                <a16:creationId xmlns:a16="http://schemas.microsoft.com/office/drawing/2014/main" id="{6EA4CFBB-F25E-47BC-BEA0-0C324F8B1A2C}"/>
+              </a:ext>
+            </a:extLst>
+          </p:cNvPr>
+          <p:cNvSpPr txBox="1"/>
+          <p:nvPr/>
+        </p:nvSpPr>
+        <p:spPr>
+          <a:xfrm>
+            <a:off x="381000" y="243235"/>
+            <a:ext cx="6099463" cy="495905"/>
+          </a:xfrm>
+          <a:prstGeom prst="rect">
+            <a:avLst/>
+          </a:prstGeom>
+          <a:noFill/>
+        </p:spPr>
+        <p:txBody>
+          <a:bodyPr wrap="square" rtlCol="0">
+            <a:spAutoFit/>
+          </a:bodyPr>
+          <a:lstStyle/>
+          <a:p>
+            <a:pPr>
+              <a:lnSpc>
+                <a:spcPct val="80000"/>
+              </a:lnSpc>
+            </a:pPr>
+            <a:r>
+              <a:rPr lang="en-US" sz="3200" b="1" dirty="0">
+                <a:solidFill>
+                  <a:schemeClr val="tx2"/>
+                </a:solidFill>
+                <a:latin typeface="Lato Black" panose="020F0502020204030203" pitchFamily="34" charset="0"/>
+                <a:ea typeface="Lato Black" panose="020F0502020204030203" pitchFamily="34" charset="0"/>
+                <a:cs typeface="Lato Black" panose="020F0502020204030203" pitchFamily="34" charset="0"/>
+              </a:rPr>
+              <a:t>Time-Intelligence Functions</a:t>
+            </a:r>
+          </a:p>
+        </p:txBody>
+      </p:sp>
+      <p:pic>
+        <p:nvPicPr>
+          <p:cNvPr id="6" name="Picture 5" descr="A picture containing plate&#10;&#10;Description automatically generated">
+            <a:extLst>
+              <a:ext uri="{FF2B5EF4-FFF2-40B4-BE49-F238E27FC236}">
+                <a16:creationId xmlns:a16="http://schemas.microsoft.com/office/drawing/2014/main" id="{7C952654-1BAB-43EF-894F-A8D9F8CC1C12}"/>
+              </a:ext>
+            </a:extLst>
+          </p:cNvPr>
+          <p:cNvPicPr>
+            <a:picLocks noChangeAspect="1"/>
+          </p:cNvPicPr>
+          <p:nvPr/>
+        </p:nvPicPr>
+        <p:blipFill>
+          <a:blip r:embed="rId3"/>
+          <a:stretch>
+            <a:fillRect/>
+          </a:stretch>
+        </p:blipFill>
+        <p:spPr>
+          <a:xfrm>
+            <a:off x="11567856" y="171945"/>
+            <a:ext cx="486287" cy="486287"/>
+          </a:xfrm>
+          <a:prstGeom prst="rect">
+            <a:avLst/>
+          </a:prstGeom>
+        </p:spPr>
+      </p:pic>
+      <p:sp>
+        <p:nvSpPr>
+          <p:cNvPr id="9" name="TextBox 8">
+            <a:extLst>
+              <a:ext uri="{FF2B5EF4-FFF2-40B4-BE49-F238E27FC236}">
+                <a16:creationId xmlns:a16="http://schemas.microsoft.com/office/drawing/2014/main" id="{02E2BD53-ABF6-4A27-9750-83FE808EDB40}"/>
+              </a:ext>
+            </a:extLst>
+          </p:cNvPr>
+          <p:cNvSpPr txBox="1"/>
+          <p:nvPr/>
+        </p:nvSpPr>
+        <p:spPr>
+          <a:xfrm>
+            <a:off x="624144" y="1787116"/>
+            <a:ext cx="10618653" cy="669414"/>
+          </a:xfrm>
+          <a:prstGeom prst="rect">
+            <a:avLst/>
+          </a:prstGeom>
+          <a:noFill/>
+        </p:spPr>
+        <p:txBody>
+          <a:bodyPr wrap="square" rtlCol="0">
+            <a:spAutoFit/>
+          </a:bodyPr>
+          <a:lstStyle/>
+          <a:p>
+            <a:pPr>
+              <a:lnSpc>
+                <a:spcPct val="150000"/>
+              </a:lnSpc>
+            </a:pPr>
+            <a:r>
+              <a:rPr lang="en-US" sz="2800" dirty="0">
+                <a:solidFill>
+                  <a:schemeClr val="tx2"/>
+                </a:solidFill>
+                <a:latin typeface="Consolas" panose="020B0609020204030204" pitchFamily="49" charset="0"/>
+              </a:rPr>
+              <a:t>TOTALMTD</a:t>
+            </a:r>
+          </a:p>
+        </p:txBody>
+      </p:sp>
+      <p:sp>
+        <p:nvSpPr>
+          <p:cNvPr id="8" name="Rectangle 7">
+            <a:extLst>
+              <a:ext uri="{FF2B5EF4-FFF2-40B4-BE49-F238E27FC236}">
+                <a16:creationId xmlns:a16="http://schemas.microsoft.com/office/drawing/2014/main" id="{63F6BC98-602C-4F26-866B-59D8A431A234}"/>
+              </a:ext>
+            </a:extLst>
+          </p:cNvPr>
+          <p:cNvSpPr/>
+          <p:nvPr/>
+        </p:nvSpPr>
+        <p:spPr>
+          <a:xfrm>
+            <a:off x="654105" y="2690336"/>
+            <a:ext cx="4886325" cy="1477328"/>
+          </a:xfrm>
+          <a:prstGeom prst="rect">
+            <a:avLst/>
+          </a:prstGeom>
+        </p:spPr>
+        <p:txBody>
+          <a:bodyPr wrap="square">
+            <a:spAutoFit/>
+          </a:bodyPr>
+          <a:lstStyle/>
+          <a:p>
+            <a:r>
+              <a:rPr lang="en-US" dirty="0">
+                <a:solidFill>
+                  <a:schemeClr val="bg1">
+                    <a:lumMod val="50000"/>
+                  </a:schemeClr>
+                </a:solidFill>
+                <a:latin typeface="Consolas" panose="020B0609020204030204" pitchFamily="49" charset="0"/>
+              </a:rPr>
+              <a:t>&lt;measure&gt; = </a:t>
+            </a:r>
+            <a:br>
+              <a:rPr lang="en-US" dirty="0">
+                <a:solidFill>
+                  <a:schemeClr val="bg1">
+                    <a:lumMod val="50000"/>
+                  </a:schemeClr>
+                </a:solidFill>
+                <a:latin typeface="Consolas" panose="020B0609020204030204" pitchFamily="49" charset="0"/>
+              </a:rPr>
+            </a:br>
+            <a:r>
+              <a:rPr lang="en-US" dirty="0">
+                <a:solidFill>
+                  <a:schemeClr val="bg1">
+                    <a:lumMod val="50000"/>
+                  </a:schemeClr>
+                </a:solidFill>
+                <a:latin typeface="Consolas" panose="020B0609020204030204" pitchFamily="49" charset="0"/>
+              </a:rPr>
+              <a:t>    TOTALMTD (</a:t>
+            </a:r>
+            <a:br>
+              <a:rPr lang="en-US" dirty="0">
+                <a:solidFill>
+                  <a:schemeClr val="bg1">
+                    <a:lumMod val="50000"/>
+                  </a:schemeClr>
+                </a:solidFill>
+                <a:latin typeface="Consolas" panose="020B0609020204030204" pitchFamily="49" charset="0"/>
+              </a:rPr>
+            </a:br>
+            <a:r>
+              <a:rPr lang="en-US" dirty="0">
+                <a:solidFill>
+                  <a:schemeClr val="bg1">
+                    <a:lumMod val="50000"/>
+                  </a:schemeClr>
+                </a:solidFill>
+                <a:latin typeface="Consolas" panose="020B0609020204030204" pitchFamily="49" charset="0"/>
+              </a:rPr>
+              <a:t>        &lt;base measure&gt;,</a:t>
+            </a:r>
+            <a:br>
+              <a:rPr lang="en-US" dirty="0">
+                <a:solidFill>
+                  <a:schemeClr val="bg1">
+                    <a:lumMod val="50000"/>
+                  </a:schemeClr>
+                </a:solidFill>
+                <a:latin typeface="Consolas" panose="020B0609020204030204" pitchFamily="49" charset="0"/>
+              </a:rPr>
+            </a:br>
+            <a:r>
+              <a:rPr lang="en-US" dirty="0">
+                <a:solidFill>
+                  <a:schemeClr val="bg1">
+                    <a:lumMod val="50000"/>
+                  </a:schemeClr>
+                </a:solidFill>
+                <a:latin typeface="Consolas" panose="020B0609020204030204" pitchFamily="49" charset="0"/>
+              </a:rPr>
+              <a:t>        &lt;date table&gt;[&lt;date column&gt;]</a:t>
+            </a:r>
+            <a:br>
+              <a:rPr lang="en-US" dirty="0">
+                <a:solidFill>
+                  <a:schemeClr val="bg1">
+                    <a:lumMod val="50000"/>
+                  </a:schemeClr>
+                </a:solidFill>
+                <a:latin typeface="Consolas" panose="020B0609020204030204" pitchFamily="49" charset="0"/>
+              </a:rPr>
+            </a:br>
+            <a:r>
+              <a:rPr lang="en-US" dirty="0">
+                <a:solidFill>
+                  <a:schemeClr val="bg1">
+                    <a:lumMod val="50000"/>
+                  </a:schemeClr>
+                </a:solidFill>
+                <a:latin typeface="Consolas" panose="020B0609020204030204" pitchFamily="49" charset="0"/>
+              </a:rPr>
+              <a:t>    )</a:t>
+            </a:r>
+          </a:p>
+        </p:txBody>
+      </p:sp>
+      <p:pic>
+        <p:nvPicPr>
+          <p:cNvPr id="3" name="Picture 2">
+            <a:extLst>
+              <a:ext uri="{FF2B5EF4-FFF2-40B4-BE49-F238E27FC236}">
+                <a16:creationId xmlns:a16="http://schemas.microsoft.com/office/drawing/2014/main" id="{C5478800-A0FA-4B94-9393-DC0459981E11}"/>
+              </a:ext>
+            </a:extLst>
+          </p:cNvPr>
+          <p:cNvPicPr>
+            <a:picLocks noChangeAspect="1"/>
+          </p:cNvPicPr>
+          <p:nvPr/>
+        </p:nvPicPr>
+        <p:blipFill>
+          <a:blip r:embed="rId4"/>
+          <a:stretch>
+            <a:fillRect/>
+          </a:stretch>
+        </p:blipFill>
+        <p:spPr>
+          <a:xfrm>
+            <a:off x="5758604" y="1598435"/>
+            <a:ext cx="5809252" cy="4098750"/>
+          </a:xfrm>
+          <a:prstGeom prst="rect">
+            <a:avLst/>
+          </a:prstGeom>
+          <a:ln>
+            <a:noFill/>
+          </a:ln>
+          <a:effectLst>
+            <a:outerShdw blurRad="292100" dist="139700" dir="2700000" algn="tl" rotWithShape="0">
+              <a:srgbClr val="333333">
+                <a:alpha val="65000"/>
+              </a:srgbClr>
+            </a:outerShdw>
+          </a:effectLst>
+        </p:spPr>
+      </p:pic>
+      <p:sp>
+        <p:nvSpPr>
+          <p:cNvPr id="4" name="Rectangle 3">
+            <a:extLst>
+              <a:ext uri="{FF2B5EF4-FFF2-40B4-BE49-F238E27FC236}">
+                <a16:creationId xmlns:a16="http://schemas.microsoft.com/office/drawing/2014/main" id="{2999C330-B2D6-4FD2-8B1F-C4BB28921445}"/>
+              </a:ext>
+            </a:extLst>
+          </p:cNvPr>
+          <p:cNvSpPr/>
+          <p:nvPr/>
+        </p:nvSpPr>
+        <p:spPr>
+          <a:xfrm>
+            <a:off x="10060786" y="2328711"/>
+            <a:ext cx="1477109" cy="361625"/>
+          </a:xfrm>
+          <a:prstGeom prst="rect">
+            <a:avLst/>
+          </a:prstGeom>
+          <a:solidFill>
+            <a:schemeClr val="accent1">
+              <a:lumMod val="20000"/>
+              <a:lumOff val="80000"/>
+              <a:alpha val="58000"/>
+            </a:schemeClr>
+          </a:solidFill>
+          <a:ln w="34925">
+            <a:solidFill>
+              <a:schemeClr val="accent1"/>
+            </a:solidFill>
+          </a:ln>
+        </p:spPr>
+        <p:style>
+          <a:lnRef idx="2">
+            <a:schemeClr val="accent5"/>
+          </a:lnRef>
+          <a:fillRef idx="1">
+            <a:schemeClr val="lt1"/>
+          </a:fillRef>
+          <a:effectRef idx="0">
+            <a:schemeClr val="accent5"/>
+          </a:effectRef>
+          <a:fontRef idx="minor">
+            <a:schemeClr val="dk1"/>
+          </a:fontRef>
+        </p:style>
+        <p:txBody>
+          <a:bodyPr rtlCol="0" anchor="ctr"/>
+          <a:lstStyle/>
+          <a:p>
+            <a:pPr algn="ctr"/>
+            <a:endParaRPr lang="en-US"/>
+          </a:p>
+        </p:txBody>
+      </p:sp>
+    </p:spTree>
+    <p:extLst>
+      <p:ext uri="{BB962C8B-B14F-4D97-AF65-F5344CB8AC3E}">
+        <p14:creationId xmlns:p14="http://schemas.microsoft.com/office/powerpoint/2010/main" val="1735124015"/>
+      </p:ext>
+    </p:extLst>
+  </p:cSld>
+  <p:clrMapOvr>
+    <a:masterClrMapping/>
+  </p:clrMapOvr>
+  <p:timing>
+    <p:tnLst>
+      <p:par>
+        <p:cTn id="1" dur="indefinite" restart="never" nodeType="tmRoot">
+          <p:childTnLst>
+            <p:seq concurrent="1" nextAc="seek">
+              <p:cTn id="2" dur="indefinite" nodeType="mainSeq">
+                <p:childTnLst>
+                  <p:par>
+                    <p:cTn id="3" fill="hold">
+                      <p:stCondLst>
+                        <p:cond delay="indefinite"/>
+                      </p:stCondLst>
+                      <p:childTnLst>
+                        <p:par>
+                          <p:cTn id="4" fill="hold">
+                            <p:stCondLst>
+                              <p:cond delay="0"/>
+                            </p:stCondLst>
+                            <p:childTnLst>
+                              <p:par>
+                                <p:cTn id="5" presetID="1" presetClass="entr" presetSubtype="0" fill="hold" grpId="0" nodeType="clickEffect">
+                                  <p:stCondLst>
+                                    <p:cond delay="0"/>
+                                  </p:stCondLst>
+                                  <p:childTnLst>
+                                    <p:set>
+                                      <p:cBhvr>
+                                        <p:cTn id="6" dur="1" fill="hold">
+                                          <p:stCondLst>
+                                            <p:cond delay="0"/>
+                                          </p:stCondLst>
+                                        </p:cTn>
+                                        <p:tgtEl>
+                                          <p:spTgt spid="4"/>
+                                        </p:tgtEl>
+                                        <p:attrNameLst>
+                                          <p:attrName>style.visibility</p:attrName>
+                                        </p:attrNameLst>
+                                      </p:cBhvr>
+                                      <p:to>
+                                        <p:strVal val="visible"/>
+                                      </p:to>
+                                    </p:set>
+                                  </p:childTnLst>
+                                </p:cTn>
+                              </p:par>
+                            </p:childTnLst>
+                          </p:cTn>
+                        </p:par>
+                      </p:childTnLst>
+                    </p:cTn>
+                  </p:par>
+                </p:childTnLst>
+              </p:cTn>
+              <p:prevCondLst>
+                <p:cond evt="onPrev" delay="0">
+                  <p:tgtEl>
+                    <p:sldTgt/>
+                  </p:tgtEl>
+                </p:cond>
+              </p:prevCondLst>
+              <p:nextCondLst>
+                <p:cond evt="onNext" delay="0">
+                  <p:tgtEl>
+                    <p:sldTgt/>
+                  </p:tgtEl>
+                </p:cond>
+              </p:nextCondLst>
+            </p:seq>
+          </p:childTnLst>
+        </p:cTn>
+      </p:par>
+    </p:tnLst>
+    <p:bldLst>
+      <p:bldP spid="4" grpId="0" animBg="1"/>
+    </p:bldLst>
+  </p:timing>
 </p:sld>
 </file>
 
@@ -11194,506 +11212,6 @@
           <p:nvPr/>
         </p:nvPicPr>
         <p:blipFill>
-          <a:blip r:embed="rId3"/>
-          <a:stretch>
-            <a:fillRect/>
-          </a:stretch>
-        </p:blipFill>
-        <p:spPr>
-          <a:xfrm>
-            <a:off x="11567856" y="171945"/>
-            <a:ext cx="486287" cy="486287"/>
-          </a:xfrm>
-          <a:prstGeom prst="rect">
-            <a:avLst/>
-          </a:prstGeom>
-        </p:spPr>
-      </p:pic>
-      <p:sp>
-        <p:nvSpPr>
-          <p:cNvPr id="9" name="TextBox 8">
-            <a:extLst>
-              <a:ext uri="{FF2B5EF4-FFF2-40B4-BE49-F238E27FC236}">
-                <a16:creationId xmlns:a16="http://schemas.microsoft.com/office/drawing/2014/main" id="{02E2BD53-ABF6-4A27-9750-83FE808EDB40}"/>
-              </a:ext>
-            </a:extLst>
-          </p:cNvPr>
-          <p:cNvSpPr txBox="1"/>
-          <p:nvPr/>
-        </p:nvSpPr>
-        <p:spPr>
-          <a:xfrm>
-            <a:off x="624144" y="1787116"/>
-            <a:ext cx="10618653" cy="669414"/>
-          </a:xfrm>
-          <a:prstGeom prst="rect">
-            <a:avLst/>
-          </a:prstGeom>
-          <a:noFill/>
-        </p:spPr>
-        <p:txBody>
-          <a:bodyPr wrap="square" rtlCol="0">
-            <a:spAutoFit/>
-          </a:bodyPr>
-          <a:lstStyle/>
-          <a:p>
-            <a:pPr>
-              <a:lnSpc>
-                <a:spcPct val="150000"/>
-              </a:lnSpc>
-            </a:pPr>
-            <a:r>
-              <a:rPr lang="en-US" sz="2800" dirty="0">
-                <a:solidFill>
-                  <a:schemeClr val="tx2"/>
-                </a:solidFill>
-                <a:latin typeface="Consolas" panose="020B0609020204030204" pitchFamily="49" charset="0"/>
-              </a:rPr>
-              <a:t>TOTALMTD</a:t>
-            </a:r>
-          </a:p>
-        </p:txBody>
-      </p:sp>
-      <p:sp>
-        <p:nvSpPr>
-          <p:cNvPr id="8" name="Rectangle 7">
-            <a:extLst>
-              <a:ext uri="{FF2B5EF4-FFF2-40B4-BE49-F238E27FC236}">
-                <a16:creationId xmlns:a16="http://schemas.microsoft.com/office/drawing/2014/main" id="{63F6BC98-602C-4F26-866B-59D8A431A234}"/>
-              </a:ext>
-            </a:extLst>
-          </p:cNvPr>
-          <p:cNvSpPr/>
-          <p:nvPr/>
-        </p:nvSpPr>
-        <p:spPr>
-          <a:xfrm>
-            <a:off x="654105" y="2690336"/>
-            <a:ext cx="4886325" cy="1477328"/>
-          </a:xfrm>
-          <a:prstGeom prst="rect">
-            <a:avLst/>
-          </a:prstGeom>
-        </p:spPr>
-        <p:txBody>
-          <a:bodyPr wrap="square">
-            <a:spAutoFit/>
-          </a:bodyPr>
-          <a:lstStyle/>
-          <a:p>
-            <a:r>
-              <a:rPr lang="en-US" dirty="0">
-                <a:solidFill>
-                  <a:schemeClr val="bg1">
-                    <a:lumMod val="50000"/>
-                  </a:schemeClr>
-                </a:solidFill>
-                <a:latin typeface="Consolas" panose="020B0609020204030204" pitchFamily="49" charset="0"/>
-              </a:rPr>
-              <a:t>&lt;measure&gt; = </a:t>
-            </a:r>
-            <a:br>
-              <a:rPr lang="en-US" dirty="0">
-                <a:solidFill>
-                  <a:schemeClr val="bg1">
-                    <a:lumMod val="50000"/>
-                  </a:schemeClr>
-                </a:solidFill>
-                <a:latin typeface="Consolas" panose="020B0609020204030204" pitchFamily="49" charset="0"/>
-              </a:rPr>
-            </a:br>
-            <a:r>
-              <a:rPr lang="en-US" dirty="0">
-                <a:solidFill>
-                  <a:schemeClr val="bg1">
-                    <a:lumMod val="50000"/>
-                  </a:schemeClr>
-                </a:solidFill>
-                <a:latin typeface="Consolas" panose="020B0609020204030204" pitchFamily="49" charset="0"/>
-              </a:rPr>
-              <a:t>    TOTALMTD (</a:t>
-            </a:r>
-            <a:br>
-              <a:rPr lang="en-US" dirty="0">
-                <a:solidFill>
-                  <a:schemeClr val="bg1">
-                    <a:lumMod val="50000"/>
-                  </a:schemeClr>
-                </a:solidFill>
-                <a:latin typeface="Consolas" panose="020B0609020204030204" pitchFamily="49" charset="0"/>
-              </a:rPr>
-            </a:br>
-            <a:r>
-              <a:rPr lang="en-US" dirty="0">
-                <a:solidFill>
-                  <a:schemeClr val="bg1">
-                    <a:lumMod val="50000"/>
-                  </a:schemeClr>
-                </a:solidFill>
-                <a:latin typeface="Consolas" panose="020B0609020204030204" pitchFamily="49" charset="0"/>
-              </a:rPr>
-              <a:t>        &lt;base measure&gt;,</a:t>
-            </a:r>
-            <a:br>
-              <a:rPr lang="en-US" dirty="0">
-                <a:solidFill>
-                  <a:schemeClr val="bg1">
-                    <a:lumMod val="50000"/>
-                  </a:schemeClr>
-                </a:solidFill>
-                <a:latin typeface="Consolas" panose="020B0609020204030204" pitchFamily="49" charset="0"/>
-              </a:rPr>
-            </a:br>
-            <a:r>
-              <a:rPr lang="en-US" dirty="0">
-                <a:solidFill>
-                  <a:schemeClr val="bg1">
-                    <a:lumMod val="50000"/>
-                  </a:schemeClr>
-                </a:solidFill>
-                <a:latin typeface="Consolas" panose="020B0609020204030204" pitchFamily="49" charset="0"/>
-              </a:rPr>
-              <a:t>        &lt;date table&gt;[&lt;date column&gt;]</a:t>
-            </a:r>
-            <a:br>
-              <a:rPr lang="en-US" dirty="0">
-                <a:solidFill>
-                  <a:schemeClr val="bg1">
-                    <a:lumMod val="50000"/>
-                  </a:schemeClr>
-                </a:solidFill>
-                <a:latin typeface="Consolas" panose="020B0609020204030204" pitchFamily="49" charset="0"/>
-              </a:rPr>
-            </a:br>
-            <a:r>
-              <a:rPr lang="en-US" dirty="0">
-                <a:solidFill>
-                  <a:schemeClr val="bg1">
-                    <a:lumMod val="50000"/>
-                  </a:schemeClr>
-                </a:solidFill>
-                <a:latin typeface="Consolas" panose="020B0609020204030204" pitchFamily="49" charset="0"/>
-              </a:rPr>
-              <a:t>    )</a:t>
-            </a:r>
-          </a:p>
-        </p:txBody>
-      </p:sp>
-      <p:pic>
-        <p:nvPicPr>
-          <p:cNvPr id="3" name="Picture 2">
-            <a:extLst>
-              <a:ext uri="{FF2B5EF4-FFF2-40B4-BE49-F238E27FC236}">
-                <a16:creationId xmlns:a16="http://schemas.microsoft.com/office/drawing/2014/main" id="{C5478800-A0FA-4B94-9393-DC0459981E11}"/>
-              </a:ext>
-            </a:extLst>
-          </p:cNvPr>
-          <p:cNvPicPr>
-            <a:picLocks noChangeAspect="1"/>
-          </p:cNvPicPr>
-          <p:nvPr/>
-        </p:nvPicPr>
-        <p:blipFill>
-          <a:blip r:embed="rId4"/>
-          <a:stretch>
-            <a:fillRect/>
-          </a:stretch>
-        </p:blipFill>
-        <p:spPr>
-          <a:xfrm>
-            <a:off x="5758604" y="1598435"/>
-            <a:ext cx="5809252" cy="4098750"/>
-          </a:xfrm>
-          <a:prstGeom prst="rect">
-            <a:avLst/>
-          </a:prstGeom>
-          <a:ln>
-            <a:noFill/>
-          </a:ln>
-          <a:effectLst>
-            <a:outerShdw blurRad="292100" dist="139700" dir="2700000" algn="tl" rotWithShape="0">
-              <a:srgbClr val="333333">
-                <a:alpha val="65000"/>
-              </a:srgbClr>
-            </a:outerShdw>
-          </a:effectLst>
-        </p:spPr>
-      </p:pic>
-      <p:sp>
-        <p:nvSpPr>
-          <p:cNvPr id="4" name="Rectangle 3">
-            <a:extLst>
-              <a:ext uri="{FF2B5EF4-FFF2-40B4-BE49-F238E27FC236}">
-                <a16:creationId xmlns:a16="http://schemas.microsoft.com/office/drawing/2014/main" id="{2999C330-B2D6-4FD2-8B1F-C4BB28921445}"/>
-              </a:ext>
-            </a:extLst>
-          </p:cNvPr>
-          <p:cNvSpPr/>
-          <p:nvPr/>
-        </p:nvSpPr>
-        <p:spPr>
-          <a:xfrm>
-            <a:off x="10060786" y="2328711"/>
-            <a:ext cx="1477109" cy="361625"/>
-          </a:xfrm>
-          <a:prstGeom prst="rect">
-            <a:avLst/>
-          </a:prstGeom>
-          <a:solidFill>
-            <a:schemeClr val="accent1">
-              <a:lumMod val="20000"/>
-              <a:lumOff val="80000"/>
-              <a:alpha val="58000"/>
-            </a:schemeClr>
-          </a:solidFill>
-          <a:ln w="34925">
-            <a:solidFill>
-              <a:schemeClr val="accent1"/>
-            </a:solidFill>
-          </a:ln>
-        </p:spPr>
-        <p:style>
-          <a:lnRef idx="2">
-            <a:schemeClr val="accent5"/>
-          </a:lnRef>
-          <a:fillRef idx="1">
-            <a:schemeClr val="lt1"/>
-          </a:fillRef>
-          <a:effectRef idx="0">
-            <a:schemeClr val="accent5"/>
-          </a:effectRef>
-          <a:fontRef idx="minor">
-            <a:schemeClr val="dk1"/>
-          </a:fontRef>
-        </p:style>
-        <p:txBody>
-          <a:bodyPr rtlCol="0" anchor="ctr"/>
-          <a:lstStyle/>
-          <a:p>
-            <a:pPr algn="ctr"/>
-            <a:endParaRPr lang="en-US"/>
-          </a:p>
-        </p:txBody>
-      </p:sp>
-    </p:spTree>
-    <p:extLst>
-      <p:ext uri="{BB962C8B-B14F-4D97-AF65-F5344CB8AC3E}">
-        <p14:creationId xmlns:p14="http://schemas.microsoft.com/office/powerpoint/2010/main" val="1735124015"/>
-      </p:ext>
-    </p:extLst>
-  </p:cSld>
-  <p:clrMapOvr>
-    <a:masterClrMapping/>
-  </p:clrMapOvr>
-  <p:timing>
-    <p:tnLst>
-      <p:par>
-        <p:cTn id="1" dur="indefinite" restart="never" nodeType="tmRoot">
-          <p:childTnLst>
-            <p:seq concurrent="1" nextAc="seek">
-              <p:cTn id="2" dur="indefinite" nodeType="mainSeq">
-                <p:childTnLst>
-                  <p:par>
-                    <p:cTn id="3" fill="hold">
-                      <p:stCondLst>
-                        <p:cond delay="indefinite"/>
-                      </p:stCondLst>
-                      <p:childTnLst>
-                        <p:par>
-                          <p:cTn id="4" fill="hold">
-                            <p:stCondLst>
-                              <p:cond delay="0"/>
-                            </p:stCondLst>
-                            <p:childTnLst>
-                              <p:par>
-                                <p:cTn id="5" presetID="1" presetClass="entr" presetSubtype="0" fill="hold" grpId="0" nodeType="clickEffect">
-                                  <p:stCondLst>
-                                    <p:cond delay="0"/>
-                                  </p:stCondLst>
-                                  <p:childTnLst>
-                                    <p:set>
-                                      <p:cBhvr>
-                                        <p:cTn id="6" dur="1" fill="hold">
-                                          <p:stCondLst>
-                                            <p:cond delay="0"/>
-                                          </p:stCondLst>
-                                        </p:cTn>
-                                        <p:tgtEl>
-                                          <p:spTgt spid="4"/>
-                                        </p:tgtEl>
-                                        <p:attrNameLst>
-                                          <p:attrName>style.visibility</p:attrName>
-                                        </p:attrNameLst>
-                                      </p:cBhvr>
-                                      <p:to>
-                                        <p:strVal val="visible"/>
-                                      </p:to>
-                                    </p:set>
-                                  </p:childTnLst>
-                                </p:cTn>
-                              </p:par>
-                            </p:childTnLst>
-                          </p:cTn>
-                        </p:par>
-                      </p:childTnLst>
-                    </p:cTn>
-                  </p:par>
-                </p:childTnLst>
-              </p:cTn>
-              <p:prevCondLst>
-                <p:cond evt="onPrev" delay="0">
-                  <p:tgtEl>
-                    <p:sldTgt/>
-                  </p:tgtEl>
-                </p:cond>
-              </p:prevCondLst>
-              <p:nextCondLst>
-                <p:cond evt="onNext" delay="0">
-                  <p:tgtEl>
-                    <p:sldTgt/>
-                  </p:tgtEl>
-                </p:cond>
-              </p:nextCondLst>
-            </p:seq>
-          </p:childTnLst>
-        </p:cTn>
-      </p:par>
-    </p:tnLst>
-    <p:bldLst>
-      <p:bldP spid="4" grpId="0" animBg="1"/>
-    </p:bldLst>
-  </p:timing>
-</p:sld>
-</file>
-
-<file path=ppt/slides/slide21.xml><?xml version="1.0" encoding="utf-8"?>
-<p:sld xmlns:a="http://schemas.openxmlformats.org/drawingml/2006/main" xmlns:r="http://schemas.openxmlformats.org/officeDocument/2006/relationships" xmlns:p="http://schemas.openxmlformats.org/presentationml/2006/main">
-  <p:cSld>
-    <p:spTree>
-      <p:nvGrpSpPr>
-        <p:cNvPr id="1" name=""/>
-        <p:cNvGrpSpPr/>
-        <p:nvPr/>
-      </p:nvGrpSpPr>
-      <p:grpSpPr>
-        <a:xfrm>
-          <a:off x="0" y="0"/>
-          <a:ext cx="0" cy="0"/>
-          <a:chOff x="0" y="0"/>
-          <a:chExt cx="0" cy="0"/>
-        </a:xfrm>
-      </p:grpSpPr>
-      <p:sp>
-        <p:nvSpPr>
-          <p:cNvPr id="2" name="Rectangle 1">
-            <a:extLst>
-              <a:ext uri="{FF2B5EF4-FFF2-40B4-BE49-F238E27FC236}">
-                <a16:creationId xmlns:a16="http://schemas.microsoft.com/office/drawing/2014/main" id="{A676ED06-08B0-4031-B887-0E4A253B700D}"/>
-              </a:ext>
-            </a:extLst>
-          </p:cNvPr>
-          <p:cNvSpPr/>
-          <p:nvPr/>
-        </p:nvSpPr>
-        <p:spPr>
-          <a:xfrm>
-            <a:off x="1" y="0"/>
-            <a:ext cx="12192000" cy="830179"/>
-          </a:xfrm>
-          <a:prstGeom prst="rect">
-            <a:avLst/>
-          </a:prstGeom>
-          <a:ln>
-            <a:noFill/>
-          </a:ln>
-        </p:spPr>
-        <p:style>
-          <a:lnRef idx="2">
-            <a:schemeClr val="accent1">
-              <a:shade val="50000"/>
-            </a:schemeClr>
-          </a:lnRef>
-          <a:fillRef idx="1">
-            <a:schemeClr val="accent1"/>
-          </a:fillRef>
-          <a:effectRef idx="0">
-            <a:schemeClr val="accent1"/>
-          </a:effectRef>
-          <a:fontRef idx="minor">
-            <a:schemeClr val="lt1"/>
-          </a:fontRef>
-        </p:style>
-        <p:txBody>
-          <a:bodyPr rtlCol="0" anchor="ctr"/>
-          <a:lstStyle/>
-          <a:p>
-            <a:pPr algn="ctr"/>
-            <a:endParaRPr lang="en-US"/>
-          </a:p>
-        </p:txBody>
-      </p:sp>
-      <p:sp>
-        <p:nvSpPr>
-          <p:cNvPr id="7" name="TextBox 6">
-            <a:extLst>
-              <a:ext uri="{FF2B5EF4-FFF2-40B4-BE49-F238E27FC236}">
-                <a16:creationId xmlns:a16="http://schemas.microsoft.com/office/drawing/2014/main" id="{6EA4CFBB-F25E-47BC-BEA0-0C324F8B1A2C}"/>
-              </a:ext>
-            </a:extLst>
-          </p:cNvPr>
-          <p:cNvSpPr txBox="1"/>
-          <p:nvPr/>
-        </p:nvSpPr>
-        <p:spPr>
-          <a:xfrm>
-            <a:off x="381000" y="243235"/>
-            <a:ext cx="6099463" cy="495905"/>
-          </a:xfrm>
-          <a:prstGeom prst="rect">
-            <a:avLst/>
-          </a:prstGeom>
-          <a:noFill/>
-        </p:spPr>
-        <p:txBody>
-          <a:bodyPr wrap="square" rtlCol="0">
-            <a:spAutoFit/>
-          </a:bodyPr>
-          <a:lstStyle/>
-          <a:p>
-            <a:pPr>
-              <a:lnSpc>
-                <a:spcPct val="80000"/>
-              </a:lnSpc>
-            </a:pPr>
-            <a:r>
-              <a:rPr lang="en-US" sz="3200" b="1" dirty="0">
-                <a:solidFill>
-                  <a:schemeClr val="tx2"/>
-                </a:solidFill>
-                <a:latin typeface="Lato Black" panose="020F0502020204030203" pitchFamily="34" charset="0"/>
-                <a:ea typeface="Lato Black" panose="020F0502020204030203" pitchFamily="34" charset="0"/>
-                <a:cs typeface="Lato Black" panose="020F0502020204030203" pitchFamily="34" charset="0"/>
-              </a:rPr>
-              <a:t>Time-Intelligence Functions</a:t>
-            </a:r>
-          </a:p>
-        </p:txBody>
-      </p:sp>
-      <p:pic>
-        <p:nvPicPr>
-          <p:cNvPr id="6" name="Picture 5" descr="A picture containing plate&#10;&#10;Description automatically generated">
-            <a:extLst>
-              <a:ext uri="{FF2B5EF4-FFF2-40B4-BE49-F238E27FC236}">
-                <a16:creationId xmlns:a16="http://schemas.microsoft.com/office/drawing/2014/main" id="{7C952654-1BAB-43EF-894F-A8D9F8CC1C12}"/>
-              </a:ext>
-            </a:extLst>
-          </p:cNvPr>
-          <p:cNvPicPr>
-            <a:picLocks noChangeAspect="1"/>
-          </p:cNvPicPr>
-          <p:nvPr/>
-        </p:nvPicPr>
-        <p:blipFill>
           <a:blip r:embed="rId2"/>
           <a:stretch>
             <a:fillRect/>
@@ -11847,7 +11365,7 @@
 </p:sld>
 </file>
 
-<file path=ppt/slides/slide22.xml><?xml version="1.0" encoding="utf-8"?>
+<file path=ppt/slides/slide21.xml><?xml version="1.0" encoding="utf-8"?>
 <p:sld xmlns:a="http://schemas.openxmlformats.org/drawingml/2006/main" xmlns:r="http://schemas.openxmlformats.org/officeDocument/2006/relationships" xmlns:p="http://schemas.openxmlformats.org/presentationml/2006/main">
   <p:cSld>
     <p:spTree>
@@ -12227,7 +11745,7 @@
 </p:sld>
 </file>
 
-<file path=ppt/slides/slide23.xml><?xml version="1.0" encoding="utf-8"?>
+<file path=ppt/slides/slide22.xml><?xml version="1.0" encoding="utf-8"?>
 <p:sld xmlns:a="http://schemas.openxmlformats.org/drawingml/2006/main" xmlns:r="http://schemas.openxmlformats.org/officeDocument/2006/relationships" xmlns:p="http://schemas.openxmlformats.org/presentationml/2006/main">
   <p:cSld>
     <p:spTree>
@@ -12932,7 +12450,7 @@
 </p:sld>
 </file>
 
-<file path=ppt/slides/slide24.xml><?xml version="1.0" encoding="utf-8"?>
+<file path=ppt/slides/slide23.xml><?xml version="1.0" encoding="utf-8"?>
 <p:sld xmlns:a="http://schemas.openxmlformats.org/drawingml/2006/main" xmlns:r="http://schemas.openxmlformats.org/officeDocument/2006/relationships" xmlns:p="http://schemas.openxmlformats.org/presentationml/2006/main">
   <p:cSld>
     <p:spTree>
@@ -13474,7 +12992,7 @@
 </p:sld>
 </file>
 
-<file path=ppt/slides/slide25.xml><?xml version="1.0" encoding="utf-8"?>
+<file path=ppt/slides/slide24.xml><?xml version="1.0" encoding="utf-8"?>
 <p:sld xmlns:a="http://schemas.openxmlformats.org/drawingml/2006/main" xmlns:r="http://schemas.openxmlformats.org/officeDocument/2006/relationships" xmlns:p="http://schemas.openxmlformats.org/presentationml/2006/main">
   <p:cSld>
     <p:spTree>
@@ -13782,7 +13300,7 @@
 </p:sld>
 </file>
 
-<file path=ppt/slides/slide26.xml><?xml version="1.0" encoding="utf-8"?>
+<file path=ppt/slides/slide25.xml><?xml version="1.0" encoding="utf-8"?>
 <p:sld xmlns:a="http://schemas.openxmlformats.org/drawingml/2006/main" xmlns:r="http://schemas.openxmlformats.org/officeDocument/2006/relationships" xmlns:p="http://schemas.openxmlformats.org/presentationml/2006/main">
   <p:cSld>
     <p:spTree>
@@ -14084,7 +13602,7 @@
 </p:sld>
 </file>
 
-<file path=ppt/slides/slide27.xml><?xml version="1.0" encoding="utf-8"?>
+<file path=ppt/slides/slide26.xml><?xml version="1.0" encoding="utf-8"?>
 <p:sld xmlns:a="http://schemas.openxmlformats.org/drawingml/2006/main" xmlns:r="http://schemas.openxmlformats.org/officeDocument/2006/relationships" xmlns:p="http://schemas.openxmlformats.org/presentationml/2006/main">
   <p:cSld>
     <p:spTree>
@@ -14394,7 +13912,7 @@
 </p:sld>
 </file>
 
-<file path=ppt/slides/slide28.xml><?xml version="1.0" encoding="utf-8"?>
+<file path=ppt/slides/slide27.xml><?xml version="1.0" encoding="utf-8"?>
 <p:sld xmlns:a="http://schemas.openxmlformats.org/drawingml/2006/main" xmlns:r="http://schemas.openxmlformats.org/officeDocument/2006/relationships" xmlns:p="http://schemas.openxmlformats.org/presentationml/2006/main">
   <p:cSld>
     <p:spTree>
@@ -14718,7 +14236,7 @@
 </p:sld>
 </file>
 
-<file path=ppt/slides/slide29.xml><?xml version="1.0" encoding="utf-8"?>
+<file path=ppt/slides/slide28.xml><?xml version="1.0" encoding="utf-8"?>
 <p:sld xmlns:a="http://schemas.openxmlformats.org/drawingml/2006/main" xmlns:r="http://schemas.openxmlformats.org/officeDocument/2006/relationships" xmlns:p="http://schemas.openxmlformats.org/presentationml/2006/main">
   <p:cSld>
     <p:spTree>
@@ -14983,6 +14501,172 @@
 </p:sld>
 </file>
 
+<file path=ppt/slides/slide29.xml><?xml version="1.0" encoding="utf-8"?>
+<p:sld xmlns:a="http://schemas.openxmlformats.org/drawingml/2006/main" xmlns:r="http://schemas.openxmlformats.org/officeDocument/2006/relationships" xmlns:p="http://schemas.openxmlformats.org/presentationml/2006/main">
+  <p:cSld>
+    <p:spTree>
+      <p:nvGrpSpPr>
+        <p:cNvPr id="1" name=""/>
+        <p:cNvGrpSpPr/>
+        <p:nvPr/>
+      </p:nvGrpSpPr>
+      <p:grpSpPr>
+        <a:xfrm>
+          <a:off x="0" y="0"/>
+          <a:ext cx="0" cy="0"/>
+          <a:chOff x="0" y="0"/>
+          <a:chExt cx="0" cy="0"/>
+        </a:xfrm>
+      </p:grpSpPr>
+      <p:sp>
+        <p:nvSpPr>
+          <p:cNvPr id="2" name="Rectangle 1">
+            <a:extLst>
+              <a:ext uri="{FF2B5EF4-FFF2-40B4-BE49-F238E27FC236}">
+                <a16:creationId xmlns:a16="http://schemas.microsoft.com/office/drawing/2014/main" id="{A676ED06-08B0-4031-B887-0E4A253B700D}"/>
+              </a:ext>
+            </a:extLst>
+          </p:cNvPr>
+          <p:cNvSpPr/>
+          <p:nvPr/>
+        </p:nvSpPr>
+        <p:spPr>
+          <a:xfrm>
+            <a:off x="1" y="0"/>
+            <a:ext cx="12192000" cy="830179"/>
+          </a:xfrm>
+          <a:prstGeom prst="rect">
+            <a:avLst/>
+          </a:prstGeom>
+          <a:ln>
+            <a:noFill/>
+          </a:ln>
+        </p:spPr>
+        <p:style>
+          <a:lnRef idx="2">
+            <a:schemeClr val="accent1">
+              <a:shade val="50000"/>
+            </a:schemeClr>
+          </a:lnRef>
+          <a:fillRef idx="1">
+            <a:schemeClr val="accent1"/>
+          </a:fillRef>
+          <a:effectRef idx="0">
+            <a:schemeClr val="accent1"/>
+          </a:effectRef>
+          <a:fontRef idx="minor">
+            <a:schemeClr val="lt1"/>
+          </a:fontRef>
+        </p:style>
+        <p:txBody>
+          <a:bodyPr rtlCol="0" anchor="ctr"/>
+          <a:lstStyle/>
+          <a:p>
+            <a:pPr algn="ctr"/>
+            <a:endParaRPr lang="en-US"/>
+          </a:p>
+        </p:txBody>
+      </p:sp>
+      <p:sp>
+        <p:nvSpPr>
+          <p:cNvPr id="7" name="TextBox 6">
+            <a:extLst>
+              <a:ext uri="{FF2B5EF4-FFF2-40B4-BE49-F238E27FC236}">
+                <a16:creationId xmlns:a16="http://schemas.microsoft.com/office/drawing/2014/main" id="{6EA4CFBB-F25E-47BC-BEA0-0C324F8B1A2C}"/>
+              </a:ext>
+            </a:extLst>
+          </p:cNvPr>
+          <p:cNvSpPr txBox="1"/>
+          <p:nvPr/>
+        </p:nvSpPr>
+        <p:spPr>
+          <a:xfrm>
+            <a:off x="381000" y="243235"/>
+            <a:ext cx="6099463" cy="495905"/>
+          </a:xfrm>
+          <a:prstGeom prst="rect">
+            <a:avLst/>
+          </a:prstGeom>
+          <a:noFill/>
+        </p:spPr>
+        <p:txBody>
+          <a:bodyPr wrap="square" rtlCol="0">
+            <a:spAutoFit/>
+          </a:bodyPr>
+          <a:lstStyle/>
+          <a:p>
+            <a:pPr>
+              <a:lnSpc>
+                <a:spcPct val="80000"/>
+              </a:lnSpc>
+            </a:pPr>
+            <a:r>
+              <a:rPr lang="en-US" sz="3200" b="1" dirty="0">
+                <a:solidFill>
+                  <a:schemeClr val="tx2"/>
+                </a:solidFill>
+                <a:latin typeface="Lato Black" panose="020F0502020204030203" pitchFamily="34" charset="0"/>
+                <a:ea typeface="Lato Black" panose="020F0502020204030203" pitchFamily="34" charset="0"/>
+                <a:cs typeface="Lato Black" panose="020F0502020204030203" pitchFamily="34" charset="0"/>
+              </a:rPr>
+              <a:t>EVALUATION CONTEXT</a:t>
+            </a:r>
+          </a:p>
+        </p:txBody>
+      </p:sp>
+      <p:pic>
+        <p:nvPicPr>
+          <p:cNvPr id="5" name="Picture 4">
+            <a:extLst>
+              <a:ext uri="{FF2B5EF4-FFF2-40B4-BE49-F238E27FC236}">
+                <a16:creationId xmlns:a16="http://schemas.microsoft.com/office/drawing/2014/main" id="{04F8F873-CD62-49B2-A3F0-07443B87DEDD}"/>
+              </a:ext>
+            </a:extLst>
+          </p:cNvPr>
+          <p:cNvPicPr>
+            <a:picLocks noChangeAspect="1"/>
+          </p:cNvPicPr>
+          <p:nvPr/>
+        </p:nvPicPr>
+        <p:blipFill>
+          <a:blip r:embed="rId2"/>
+          <a:stretch>
+            <a:fillRect/>
+          </a:stretch>
+        </p:blipFill>
+        <p:spPr>
+          <a:xfrm>
+            <a:off x="3766195" y="1799765"/>
+            <a:ext cx="4659608" cy="3258468"/>
+          </a:xfrm>
+          <a:prstGeom prst="rect">
+            <a:avLst/>
+          </a:prstGeom>
+          <a:ln>
+            <a:noFill/>
+          </a:ln>
+          <a:effectLst>
+            <a:outerShdw blurRad="292100" dist="139700" dir="2700000" algn="tl" rotWithShape="0">
+              <a:srgbClr val="333333">
+                <a:alpha val="65000"/>
+              </a:srgbClr>
+            </a:outerShdw>
+          </a:effectLst>
+        </p:spPr>
+      </p:pic>
+    </p:spTree>
+    <p:extLst>
+      <p:ext uri="{BB962C8B-B14F-4D97-AF65-F5344CB8AC3E}">
+        <p14:creationId xmlns:p14="http://schemas.microsoft.com/office/powerpoint/2010/main" val="2588434853"/>
+      </p:ext>
+    </p:extLst>
+  </p:cSld>
+  <p:clrMapOvr>
+    <a:masterClrMapping/>
+  </p:clrMapOvr>
+</p:sld>
+</file>
+
 <file path=ppt/slides/slide3.xml><?xml version="1.0" encoding="utf-8"?>
 <p:sld xmlns:a="http://schemas.openxmlformats.org/drawingml/2006/main" xmlns:r="http://schemas.openxmlformats.org/officeDocument/2006/relationships" xmlns:p="http://schemas.openxmlformats.org/presentationml/2006/main">
   <p:cSld>
@@ -15373,10 +15057,10 @@
       </p:sp>
       <p:pic>
         <p:nvPicPr>
-          <p:cNvPr id="3" name="Picture 2">
+          <p:cNvPr id="6" name="Picture 5">
             <a:extLst>
               <a:ext uri="{FF2B5EF4-FFF2-40B4-BE49-F238E27FC236}">
-                <a16:creationId xmlns:a16="http://schemas.microsoft.com/office/drawing/2014/main" id="{9CCB8BBF-1470-4531-8F91-7699118708A4}"/>
+                <a16:creationId xmlns:a16="http://schemas.microsoft.com/office/drawing/2014/main" id="{859E7605-2A64-4723-B5E1-C7D3EDB3CE1D}"/>
               </a:ext>
             </a:extLst>
           </p:cNvPr>
@@ -15386,15 +15070,15 @@
           <p:nvPr/>
         </p:nvPicPr>
         <p:blipFill>
-          <a:blip r:embed="rId2"/>
+          <a:blip r:embed="rId3"/>
           <a:stretch>
             <a:fillRect/>
           </a:stretch>
         </p:blipFill>
         <p:spPr>
           <a:xfrm>
-            <a:off x="1769294" y="2148787"/>
-            <a:ext cx="8653411" cy="2560425"/>
+            <a:off x="6539895" y="2629529"/>
+            <a:ext cx="3271317" cy="3549271"/>
           </a:xfrm>
           <a:prstGeom prst="rect">
             <a:avLst/>
@@ -15413,10 +15097,10 @@
       </p:pic>
       <p:pic>
         <p:nvPicPr>
-          <p:cNvPr id="5" name="Picture 4">
+          <p:cNvPr id="8" name="Picture 7">
             <a:extLst>
               <a:ext uri="{FF2B5EF4-FFF2-40B4-BE49-F238E27FC236}">
-                <a16:creationId xmlns:a16="http://schemas.microsoft.com/office/drawing/2014/main" id="{04F8F873-CD62-49B2-A3F0-07443B87DEDD}"/>
+                <a16:creationId xmlns:a16="http://schemas.microsoft.com/office/drawing/2014/main" id="{BBC62B1B-A7D5-4288-919C-A57BD16DB02B}"/>
               </a:ext>
             </a:extLst>
           </p:cNvPr>
@@ -15426,15 +15110,15 @@
           <p:nvPr/>
         </p:nvPicPr>
         <p:blipFill>
-          <a:blip r:embed="rId3"/>
+          <a:blip r:embed="rId4"/>
           <a:stretch>
             <a:fillRect/>
           </a:stretch>
         </p:blipFill>
         <p:spPr>
           <a:xfrm>
-            <a:off x="3766195" y="1799765"/>
-            <a:ext cx="4659608" cy="3258468"/>
+            <a:off x="2128426" y="1285503"/>
+            <a:ext cx="3276108" cy="2977193"/>
           </a:xfrm>
           <a:prstGeom prst="rect">
             <a:avLst/>
@@ -15451,91 +15135,215 @@
           </a:effectLst>
         </p:spPr>
       </p:pic>
+      <p:grpSp>
+        <p:nvGrpSpPr>
+          <p:cNvPr id="20" name="Group 19">
+            <a:extLst>
+              <a:ext uri="{FF2B5EF4-FFF2-40B4-BE49-F238E27FC236}">
+                <a16:creationId xmlns:a16="http://schemas.microsoft.com/office/drawing/2014/main" id="{55E8FD8A-C859-42A1-AE7C-3BBBB3F562A1}"/>
+              </a:ext>
+            </a:extLst>
+          </p:cNvPr>
+          <p:cNvGrpSpPr/>
+          <p:nvPr/>
+        </p:nvGrpSpPr>
+        <p:grpSpPr>
+          <a:xfrm>
+            <a:off x="5404534" y="2774100"/>
+            <a:ext cx="1135361" cy="1630065"/>
+            <a:chOff x="5404534" y="2774100"/>
+            <a:chExt cx="1135361" cy="1630065"/>
+          </a:xfrm>
+        </p:grpSpPr>
+        <p:cxnSp>
+          <p:nvCxnSpPr>
+            <p:cNvPr id="16" name="Connector: Elbow 15">
+              <a:extLst>
+                <a:ext uri="{FF2B5EF4-FFF2-40B4-BE49-F238E27FC236}">
+                  <a16:creationId xmlns:a16="http://schemas.microsoft.com/office/drawing/2014/main" id="{9F28DB5E-FF1F-4654-AB54-49E1E1B355B0}"/>
+                </a:ext>
+              </a:extLst>
+            </p:cNvPr>
+            <p:cNvCxnSpPr>
+              <a:stCxn id="8" idx="3"/>
+              <a:endCxn id="6" idx="1"/>
+            </p:cNvCxnSpPr>
+            <p:nvPr/>
+          </p:nvCxnSpPr>
+          <p:spPr>
+            <a:xfrm>
+              <a:off x="5404534" y="2774100"/>
+              <a:ext cx="1135361" cy="1630065"/>
+            </a:xfrm>
+            <a:prstGeom prst="bentConnector3">
+              <a:avLst/>
+            </a:prstGeom>
+            <a:ln w="38100">
+              <a:solidFill>
+                <a:schemeClr val="accent5">
+                  <a:lumMod val="65000"/>
+                  <a:lumOff val="35000"/>
+                </a:schemeClr>
+              </a:solidFill>
+              <a:headEnd type="none" w="med" len="med"/>
+              <a:tailEnd type="none" w="med" len="med"/>
+            </a:ln>
+          </p:spPr>
+          <p:style>
+            <a:lnRef idx="1">
+              <a:schemeClr val="accent1"/>
+            </a:lnRef>
+            <a:fillRef idx="0">
+              <a:schemeClr val="accent1"/>
+            </a:fillRef>
+            <a:effectRef idx="0">
+              <a:schemeClr val="accent1"/>
+            </a:effectRef>
+            <a:fontRef idx="minor">
+              <a:schemeClr val="tx1"/>
+            </a:fontRef>
+          </p:style>
+        </p:cxnSp>
+        <p:grpSp>
+          <p:nvGrpSpPr>
+            <p:cNvPr id="19" name="Group 18">
+              <a:extLst>
+                <a:ext uri="{FF2B5EF4-FFF2-40B4-BE49-F238E27FC236}">
+                  <a16:creationId xmlns:a16="http://schemas.microsoft.com/office/drawing/2014/main" id="{D69EE3FE-7A35-47EB-BB72-AB96622FA041}"/>
+                </a:ext>
+              </a:extLst>
+            </p:cNvPr>
+            <p:cNvGrpSpPr/>
+            <p:nvPr/>
+          </p:nvGrpSpPr>
+          <p:grpSpPr>
+            <a:xfrm>
+              <a:off x="5853753" y="3376406"/>
+              <a:ext cx="236921" cy="212726"/>
+              <a:chOff x="5437486" y="1701533"/>
+              <a:chExt cx="236921" cy="212726"/>
+            </a:xfrm>
+          </p:grpSpPr>
+          <p:sp>
+            <p:nvSpPr>
+              <p:cNvPr id="18" name="Rectangle 17">
+                <a:extLst>
+                  <a:ext uri="{FF2B5EF4-FFF2-40B4-BE49-F238E27FC236}">
+                    <a16:creationId xmlns:a16="http://schemas.microsoft.com/office/drawing/2014/main" id="{A599770A-ED75-4F6F-9588-B39008BF74FA}"/>
+                  </a:ext>
+                </a:extLst>
+              </p:cNvPr>
+              <p:cNvSpPr/>
+              <p:nvPr/>
+            </p:nvSpPr>
+            <p:spPr>
+              <a:xfrm>
+                <a:off x="5437486" y="1701533"/>
+                <a:ext cx="236921" cy="212726"/>
+              </a:xfrm>
+              <a:prstGeom prst="rect">
+                <a:avLst/>
+              </a:prstGeom>
+              <a:solidFill>
+                <a:schemeClr val="bg1"/>
+              </a:solidFill>
+              <a:ln>
+                <a:solidFill>
+                  <a:schemeClr val="tx1"/>
+                </a:solidFill>
+              </a:ln>
+            </p:spPr>
+            <p:style>
+              <a:lnRef idx="2">
+                <a:schemeClr val="accent1">
+                  <a:shade val="50000"/>
+                </a:schemeClr>
+              </a:lnRef>
+              <a:fillRef idx="1">
+                <a:schemeClr val="accent1"/>
+              </a:fillRef>
+              <a:effectRef idx="0">
+                <a:schemeClr val="accent1"/>
+              </a:effectRef>
+              <a:fontRef idx="minor">
+                <a:schemeClr val="lt1"/>
+              </a:fontRef>
+            </p:style>
+            <p:txBody>
+              <a:bodyPr rtlCol="0" anchor="ctr"/>
+              <a:lstStyle/>
+              <a:p>
+                <a:pPr algn="ctr"/>
+                <a:endParaRPr lang="en-US"/>
+              </a:p>
+            </p:txBody>
+          </p:sp>
+          <p:sp>
+            <p:nvSpPr>
+              <p:cNvPr id="17" name="Isosceles Triangle 16">
+                <a:extLst>
+                  <a:ext uri="{FF2B5EF4-FFF2-40B4-BE49-F238E27FC236}">
+                    <a16:creationId xmlns:a16="http://schemas.microsoft.com/office/drawing/2014/main" id="{5D1C2641-E4DC-4620-AA2F-AA3DDC400BCB}"/>
+                  </a:ext>
+                </a:extLst>
+              </p:cNvPr>
+              <p:cNvSpPr/>
+              <p:nvPr/>
+            </p:nvSpPr>
+            <p:spPr>
+              <a:xfrm rot="10800000">
+                <a:off x="5463124" y="1743342"/>
+                <a:ext cx="177099" cy="162370"/>
+              </a:xfrm>
+              <a:prstGeom prst="triangle">
+                <a:avLst/>
+              </a:prstGeom>
+              <a:solidFill>
+                <a:schemeClr val="accent2"/>
+              </a:solidFill>
+              <a:ln>
+                <a:solidFill>
+                  <a:schemeClr val="bg1"/>
+                </a:solidFill>
+              </a:ln>
+            </p:spPr>
+            <p:style>
+              <a:lnRef idx="2">
+                <a:schemeClr val="accent1">
+                  <a:shade val="50000"/>
+                </a:schemeClr>
+              </a:lnRef>
+              <a:fillRef idx="1">
+                <a:schemeClr val="accent1"/>
+              </a:fillRef>
+              <a:effectRef idx="0">
+                <a:schemeClr val="accent1"/>
+              </a:effectRef>
+              <a:fontRef idx="minor">
+                <a:schemeClr val="lt1"/>
+              </a:fontRef>
+            </p:style>
+            <p:txBody>
+              <a:bodyPr rtlCol="0" anchor="ctr"/>
+              <a:lstStyle/>
+              <a:p>
+                <a:pPr algn="ctr"/>
+                <a:endParaRPr lang="en-US"/>
+              </a:p>
+            </p:txBody>
+          </p:sp>
+        </p:grpSp>
+      </p:grpSp>
     </p:spTree>
     <p:extLst>
       <p:ext uri="{BB962C8B-B14F-4D97-AF65-F5344CB8AC3E}">
-        <p14:creationId xmlns:p14="http://schemas.microsoft.com/office/powerpoint/2010/main" val="2588434853"/>
+        <p14:creationId xmlns:p14="http://schemas.microsoft.com/office/powerpoint/2010/main" val="936020824"/>
       </p:ext>
     </p:extLst>
   </p:cSld>
   <p:clrMapOvr>
     <a:masterClrMapping/>
   </p:clrMapOvr>
-  <p:timing>
-    <p:tnLst>
-      <p:par>
-        <p:cTn id="1" dur="indefinite" restart="never" nodeType="tmRoot">
-          <p:childTnLst>
-            <p:seq concurrent="1" nextAc="seek">
-              <p:cTn id="2" dur="indefinite" nodeType="mainSeq">
-                <p:childTnLst>
-                  <p:par>
-                    <p:cTn id="3" fill="hold">
-                      <p:stCondLst>
-                        <p:cond delay="indefinite"/>
-                      </p:stCondLst>
-                      <p:childTnLst>
-                        <p:par>
-                          <p:cTn id="4" fill="hold">
-                            <p:stCondLst>
-                              <p:cond delay="0"/>
-                            </p:stCondLst>
-                            <p:childTnLst>
-                              <p:par>
-                                <p:cTn id="5" presetID="1" presetClass="entr" presetSubtype="0" fill="hold" nodeType="clickEffect">
-                                  <p:stCondLst>
-                                    <p:cond delay="0"/>
-                                  </p:stCondLst>
-                                  <p:childTnLst>
-                                    <p:set>
-                                      <p:cBhvr>
-                                        <p:cTn id="6" dur="1" fill="hold">
-                                          <p:stCondLst>
-                                            <p:cond delay="0"/>
-                                          </p:stCondLst>
-                                        </p:cTn>
-                                        <p:tgtEl>
-                                          <p:spTgt spid="5"/>
-                                        </p:tgtEl>
-                                        <p:attrNameLst>
-                                          <p:attrName>style.visibility</p:attrName>
-                                        </p:attrNameLst>
-                                      </p:cBhvr>
-                                      <p:to>
-                                        <p:strVal val="visible"/>
-                                      </p:to>
-                                    </p:set>
-                                  </p:childTnLst>
-                                </p:cTn>
-                              </p:par>
-                            </p:childTnLst>
-                          </p:cTn>
-                        </p:par>
-                      </p:childTnLst>
-                    </p:cTn>
-                  </p:par>
-                </p:childTnLst>
-              </p:cTn>
-              <p:prevCondLst>
-                <p:cond evt="onPrev" delay="0">
-                  <p:tgtEl>
-                    <p:sldTgt/>
-                  </p:tgtEl>
-                </p:cond>
-              </p:prevCondLst>
-              <p:nextCondLst>
-                <p:cond evt="onNext" delay="0">
-                  <p:tgtEl>
-                    <p:sldTgt/>
-                  </p:tgtEl>
-                </p:cond>
-              </p:nextCondLst>
-            </p:seq>
-          </p:childTnLst>
-        </p:cTn>
-      </p:par>
-    </p:tnLst>
-  </p:timing>
 </p:sld>
 </file>
 
@@ -15931,7 +15739,7 @@
     </p:spTree>
     <p:extLst>
       <p:ext uri="{BB962C8B-B14F-4D97-AF65-F5344CB8AC3E}">
-        <p14:creationId xmlns:p14="http://schemas.microsoft.com/office/powerpoint/2010/main" val="936020824"/>
+        <p14:creationId xmlns:p14="http://schemas.microsoft.com/office/powerpoint/2010/main" val="1141097315"/>
       </p:ext>
     </p:extLst>
   </p:cSld>
@@ -20507,8 +20315,8 @@
         </p:nvSpPr>
         <p:spPr>
           <a:xfrm>
-            <a:off x="0" y="-749"/>
-            <a:ext cx="12192002" cy="6472052"/>
+            <a:off x="0" y="0"/>
+            <a:ext cx="12192002" cy="6479849"/>
           </a:xfrm>
           <a:prstGeom prst="rect">
             <a:avLst/>
@@ -20827,7 +20635,7 @@
         <p:spPr>
           <a:xfrm>
             <a:off x="786673" y="1226765"/>
-            <a:ext cx="7756078" cy="3739806"/>
+            <a:ext cx="7756078" cy="4651658"/>
           </a:xfrm>
           <a:prstGeom prst="rect">
             <a:avLst/>
@@ -20856,7 +20664,7 @@
             </a:r>
           </a:p>
           <a:p>
-            <a:pPr marL="342900" indent="-342900">
+            <a:pPr marL="800100" lvl="1" indent="-342900">
               <a:lnSpc>
                 <a:spcPct val="150000"/>
               </a:lnSpc>
@@ -20870,11 +20678,38 @@
                 </a:solidFill>
                 <a:latin typeface="Lato" panose="020F0502020204030203"/>
               </a:rPr>
-              <a:t>Comparing Weeks</a:t>
-            </a:r>
-          </a:p>
-          <a:p>
-            <a:pPr marL="342900" indent="-342900">
+              <a:t>Weeks (or custom periods)</a:t>
+            </a:r>
+          </a:p>
+          <a:p>
+            <a:pPr marL="800100" lvl="1" indent="-342900">
+              <a:lnSpc>
+                <a:spcPct val="150000"/>
+              </a:lnSpc>
+              <a:buFont typeface="Arial" panose="020B0604020202020204" pitchFamily="34" charset="0"/>
+              <a:buChar char="•"/>
+            </a:pPr>
+            <a:r>
+              <a:rPr lang="en-US" sz="2000" dirty="0">
+                <a:solidFill>
+                  <a:schemeClr val="tx2"/>
+                </a:solidFill>
+                <a:latin typeface="Lato" panose="020F0502020204030203"/>
+              </a:rPr>
+              <a:t>Handling (Grand) Totals </a:t>
+            </a:r>
+            <a:r>
+              <a:rPr lang="en-US" sz="1600" dirty="0">
+                <a:solidFill>
+                  <a:schemeClr val="tx2"/>
+                </a:solidFill>
+                <a:latin typeface="Lato" panose="020F0502020204030203"/>
+              </a:rPr>
+              <a:t>(matrix/table)</a:t>
+            </a:r>
+          </a:p>
+          <a:p>
+            <a:pPr marL="800100" lvl="1" indent="-342900">
               <a:lnSpc>
                 <a:spcPct val="150000"/>
               </a:lnSpc>
@@ -20892,7 +20727,7 @@
             </a:r>
           </a:p>
           <a:p>
-            <a:pPr marL="342900" indent="-342900">
+            <a:pPr marL="800100" lvl="1" indent="-342900">
               <a:lnSpc>
                 <a:spcPct val="150000"/>
               </a:lnSpc>
@@ -20906,11 +20741,11 @@
                 </a:solidFill>
                 <a:latin typeface="Lato" panose="020F0502020204030203"/>
               </a:rPr>
-              <a:t>Adjacent periods of different size (March vs Feb)</a:t>
-            </a:r>
-          </a:p>
-          <a:p>
-            <a:pPr marL="342900" indent="-342900">
+              <a:t>Periods of different size (March vs Feb)</a:t>
+            </a:r>
+          </a:p>
+          <a:p>
+            <a:pPr marL="800100" lvl="1" indent="-342900">
               <a:lnSpc>
                 <a:spcPct val="150000"/>
               </a:lnSpc>
@@ -20928,6 +20763,60 @@
             </a:r>
           </a:p>
           <a:p>
+            <a:pPr marL="1257300" lvl="2" indent="-342900">
+              <a:lnSpc>
+                <a:spcPct val="150000"/>
+              </a:lnSpc>
+              <a:buFont typeface="Arial" panose="020B0604020202020204" pitchFamily="34" charset="0"/>
+              <a:buChar char="•"/>
+            </a:pPr>
+            <a:r>
+              <a:rPr lang="en-US" sz="1600" dirty="0">
+                <a:solidFill>
+                  <a:schemeClr val="tx2"/>
+                </a:solidFill>
+                <a:latin typeface="Lato" panose="020F0502020204030203"/>
+              </a:rPr>
+              <a:t>Year = SPLY </a:t>
+            </a:r>
+          </a:p>
+          <a:p>
+            <a:pPr marL="1257300" lvl="2" indent="-342900">
+              <a:lnSpc>
+                <a:spcPct val="150000"/>
+              </a:lnSpc>
+              <a:buFont typeface="Arial" panose="020B0604020202020204" pitchFamily="34" charset="0"/>
+              <a:buChar char="•"/>
+            </a:pPr>
+            <a:r>
+              <a:rPr lang="en-US" sz="1600" dirty="0">
+                <a:solidFill>
+                  <a:schemeClr val="tx2"/>
+                </a:solidFill>
+                <a:latin typeface="Lato" panose="020F0502020204030203"/>
+              </a:rPr>
+              <a:t>Quarter = PQ (previous quarter)</a:t>
+            </a:r>
+          </a:p>
+          <a:p>
+            <a:pPr marL="1257300" lvl="2" indent="-342900">
+              <a:lnSpc>
+                <a:spcPct val="150000"/>
+              </a:lnSpc>
+              <a:buFont typeface="Arial" panose="020B0604020202020204" pitchFamily="34" charset="0"/>
+              <a:buChar char="•"/>
+            </a:pPr>
+            <a:r>
+              <a:rPr lang="en-US" sz="1600" dirty="0">
+                <a:solidFill>
+                  <a:schemeClr val="tx2"/>
+                </a:solidFill>
+                <a:latin typeface="Lato" panose="020F0502020204030203"/>
+              </a:rPr>
+              <a:t>Month = SPLQ (same-period-last-quarter)</a:t>
+            </a:r>
+          </a:p>
+          <a:p>
             <a:pPr marL="800100" lvl="1" indent="-342900">
               <a:lnSpc>
                 <a:spcPct val="150000"/>
@@ -20936,49 +20825,13 @@
               <a:buChar char="•"/>
             </a:pPr>
             <a:r>
-              <a:rPr lang="en-US" sz="1600" dirty="0">
+              <a:rPr lang="en-US" sz="2000" dirty="0">
                 <a:solidFill>
                   <a:schemeClr val="tx2"/>
                 </a:solidFill>
                 <a:latin typeface="Lato" panose="020F0502020204030203"/>
               </a:rPr>
-              <a:t>Year = SPLY </a:t>
-            </a:r>
-          </a:p>
-          <a:p>
-            <a:pPr marL="800100" lvl="1" indent="-342900">
-              <a:lnSpc>
-                <a:spcPct val="150000"/>
-              </a:lnSpc>
-              <a:buFont typeface="Arial" panose="020B0604020202020204" pitchFamily="34" charset="0"/>
-              <a:buChar char="•"/>
-            </a:pPr>
-            <a:r>
-              <a:rPr lang="en-US" sz="1600" dirty="0">
-                <a:solidFill>
-                  <a:schemeClr val="tx2"/>
-                </a:solidFill>
-                <a:latin typeface="Lato" panose="020F0502020204030203"/>
-              </a:rPr>
-              <a:t>Quarter = PQ (previous quarter)</a:t>
-            </a:r>
-          </a:p>
-          <a:p>
-            <a:pPr marL="800100" lvl="1" indent="-342900">
-              <a:lnSpc>
-                <a:spcPct val="150000"/>
-              </a:lnSpc>
-              <a:buFont typeface="Arial" panose="020B0604020202020204" pitchFamily="34" charset="0"/>
-              <a:buChar char="•"/>
-            </a:pPr>
-            <a:r>
-              <a:rPr lang="en-US" sz="1600" dirty="0">
-                <a:solidFill>
-                  <a:schemeClr val="tx2"/>
-                </a:solidFill>
-                <a:latin typeface="Lato" panose="020F0502020204030203"/>
-              </a:rPr>
-              <a:t>Month = SPLQ (same-period-last-quarter)</a:t>
+              <a:t>Time… hours, minutes, seconds?</a:t>
             </a:r>
           </a:p>
         </p:txBody>
@@ -21027,6 +20880,293 @@
 </file>
 
 <file path=ppt/slides/slide41.xml><?xml version="1.0" encoding="utf-8"?>
+<p:sld xmlns:a="http://schemas.openxmlformats.org/drawingml/2006/main" xmlns:r="http://schemas.openxmlformats.org/officeDocument/2006/relationships" xmlns:p="http://schemas.openxmlformats.org/presentationml/2006/main">
+  <p:cSld>
+    <p:spTree>
+      <p:nvGrpSpPr>
+        <p:cNvPr id="1" name=""/>
+        <p:cNvGrpSpPr/>
+        <p:nvPr/>
+      </p:nvGrpSpPr>
+      <p:grpSpPr>
+        <a:xfrm>
+          <a:off x="0" y="0"/>
+          <a:ext cx="0" cy="0"/>
+          <a:chOff x="0" y="0"/>
+          <a:chExt cx="0" cy="0"/>
+        </a:xfrm>
+      </p:grpSpPr>
+      <p:sp>
+        <p:nvSpPr>
+          <p:cNvPr id="2" name="Rectangle 1">
+            <a:extLst>
+              <a:ext uri="{FF2B5EF4-FFF2-40B4-BE49-F238E27FC236}">
+                <a16:creationId xmlns:a16="http://schemas.microsoft.com/office/drawing/2014/main" id="{A676ED06-08B0-4031-B887-0E4A253B700D}"/>
+              </a:ext>
+            </a:extLst>
+          </p:cNvPr>
+          <p:cNvSpPr/>
+          <p:nvPr/>
+        </p:nvSpPr>
+        <p:spPr>
+          <a:xfrm>
+            <a:off x="1" y="0"/>
+            <a:ext cx="12192000" cy="830179"/>
+          </a:xfrm>
+          <a:prstGeom prst="rect">
+            <a:avLst/>
+          </a:prstGeom>
+          <a:ln>
+            <a:noFill/>
+          </a:ln>
+        </p:spPr>
+        <p:style>
+          <a:lnRef idx="2">
+            <a:schemeClr val="accent1">
+              <a:shade val="50000"/>
+            </a:schemeClr>
+          </a:lnRef>
+          <a:fillRef idx="1">
+            <a:schemeClr val="accent1"/>
+          </a:fillRef>
+          <a:effectRef idx="0">
+            <a:schemeClr val="accent1"/>
+          </a:effectRef>
+          <a:fontRef idx="minor">
+            <a:schemeClr val="lt1"/>
+          </a:fontRef>
+        </p:style>
+        <p:txBody>
+          <a:bodyPr rtlCol="0" anchor="ctr"/>
+          <a:lstStyle/>
+          <a:p>
+            <a:pPr algn="ctr"/>
+            <a:endParaRPr lang="en-US"/>
+          </a:p>
+        </p:txBody>
+      </p:sp>
+      <p:sp>
+        <p:nvSpPr>
+          <p:cNvPr id="7" name="TextBox 6">
+            <a:extLst>
+              <a:ext uri="{FF2B5EF4-FFF2-40B4-BE49-F238E27FC236}">
+                <a16:creationId xmlns:a16="http://schemas.microsoft.com/office/drawing/2014/main" id="{6EA4CFBB-F25E-47BC-BEA0-0C324F8B1A2C}"/>
+              </a:ext>
+            </a:extLst>
+          </p:cNvPr>
+          <p:cNvSpPr txBox="1"/>
+          <p:nvPr/>
+        </p:nvSpPr>
+        <p:spPr>
+          <a:xfrm>
+            <a:off x="381000" y="243235"/>
+            <a:ext cx="8031480" cy="486287"/>
+          </a:xfrm>
+          <a:prstGeom prst="rect">
+            <a:avLst/>
+          </a:prstGeom>
+          <a:noFill/>
+        </p:spPr>
+        <p:txBody>
+          <a:bodyPr wrap="square" rtlCol="0">
+            <a:spAutoFit/>
+          </a:bodyPr>
+          <a:lstStyle/>
+          <a:p>
+            <a:pPr>
+              <a:lnSpc>
+                <a:spcPct val="80000"/>
+              </a:lnSpc>
+            </a:pPr>
+            <a:r>
+              <a:rPr lang="en-US" sz="3200" b="1" dirty="0">
+                <a:solidFill>
+                  <a:schemeClr val="tx2"/>
+                </a:solidFill>
+                <a:latin typeface="Lato Black" panose="020F0502020204030203" pitchFamily="34" charset="0"/>
+                <a:ea typeface="Lato Black" panose="020F0502020204030203" pitchFamily="34" charset="0"/>
+                <a:cs typeface="Lato Black" panose="020F0502020204030203" pitchFamily="34" charset="0"/>
+              </a:rPr>
+              <a:t>HARD(ER) STUFF</a:t>
+            </a:r>
+          </a:p>
+        </p:txBody>
+      </p:sp>
+      <p:sp>
+        <p:nvSpPr>
+          <p:cNvPr id="9" name="TextBox 8">
+            <a:extLst>
+              <a:ext uri="{FF2B5EF4-FFF2-40B4-BE49-F238E27FC236}">
+                <a16:creationId xmlns:a16="http://schemas.microsoft.com/office/drawing/2014/main" id="{B3FDD1E9-A122-435C-B6ED-EC0987A9EF76}"/>
+              </a:ext>
+            </a:extLst>
+          </p:cNvPr>
+          <p:cNvSpPr txBox="1"/>
+          <p:nvPr/>
+        </p:nvSpPr>
+        <p:spPr>
+          <a:xfrm>
+            <a:off x="2217961" y="1109230"/>
+            <a:ext cx="7756078" cy="739241"/>
+          </a:xfrm>
+          <a:prstGeom prst="rect">
+            <a:avLst/>
+          </a:prstGeom>
+          <a:noFill/>
+        </p:spPr>
+        <p:txBody>
+          <a:bodyPr wrap="square" rtlCol="0">
+            <a:spAutoFit/>
+          </a:bodyPr>
+          <a:lstStyle/>
+          <a:p>
+            <a:pPr algn="ctr">
+              <a:lnSpc>
+                <a:spcPct val="150000"/>
+              </a:lnSpc>
+            </a:pPr>
+            <a:r>
+              <a:rPr lang="en-US" sz="3200" dirty="0">
+                <a:solidFill>
+                  <a:schemeClr val="tx2"/>
+                </a:solidFill>
+                <a:latin typeface="Lato" panose="020F0502020204030203"/>
+              </a:rPr>
+              <a:t>Helper Columns Are Your Best Friend!</a:t>
+            </a:r>
+            <a:endParaRPr lang="en-US" sz="2000" dirty="0">
+              <a:solidFill>
+                <a:schemeClr val="tx2"/>
+              </a:solidFill>
+              <a:latin typeface="Lato" panose="020F0502020204030203"/>
+            </a:endParaRPr>
+          </a:p>
+        </p:txBody>
+      </p:sp>
+      <p:pic>
+        <p:nvPicPr>
+          <p:cNvPr id="6" name="Picture 5" descr="A picture containing plate&#10;&#10;Description automatically generated">
+            <a:extLst>
+              <a:ext uri="{FF2B5EF4-FFF2-40B4-BE49-F238E27FC236}">
+                <a16:creationId xmlns:a16="http://schemas.microsoft.com/office/drawing/2014/main" id="{ECDF19A4-1B9D-4919-8E18-677130A7249E}"/>
+              </a:ext>
+            </a:extLst>
+          </p:cNvPr>
+          <p:cNvPicPr>
+            <a:picLocks noChangeAspect="1"/>
+          </p:cNvPicPr>
+          <p:nvPr/>
+        </p:nvPicPr>
+        <p:blipFill>
+          <a:blip r:embed="rId3"/>
+          <a:stretch>
+            <a:fillRect/>
+          </a:stretch>
+        </p:blipFill>
+        <p:spPr>
+          <a:xfrm>
+            <a:off x="11567856" y="171945"/>
+            <a:ext cx="486287" cy="486287"/>
+          </a:xfrm>
+          <a:prstGeom prst="rect">
+            <a:avLst/>
+          </a:prstGeom>
+        </p:spPr>
+      </p:pic>
+      <p:pic>
+        <p:nvPicPr>
+          <p:cNvPr id="3" name="Picture 2">
+            <a:extLst>
+              <a:ext uri="{FF2B5EF4-FFF2-40B4-BE49-F238E27FC236}">
+                <a16:creationId xmlns:a16="http://schemas.microsoft.com/office/drawing/2014/main" id="{5DEDC25F-E756-4064-BC06-462F4DE28064}"/>
+              </a:ext>
+            </a:extLst>
+          </p:cNvPr>
+          <p:cNvPicPr>
+            <a:picLocks noChangeAspect="1"/>
+          </p:cNvPicPr>
+          <p:nvPr/>
+        </p:nvPicPr>
+        <p:blipFill>
+          <a:blip r:embed="rId4"/>
+          <a:stretch>
+            <a:fillRect/>
+          </a:stretch>
+        </p:blipFill>
+        <p:spPr>
+          <a:xfrm>
+            <a:off x="6471928" y="2866764"/>
+            <a:ext cx="5339071" cy="1945866"/>
+          </a:xfrm>
+          <a:prstGeom prst="rect">
+            <a:avLst/>
+          </a:prstGeom>
+          <a:ln>
+            <a:noFill/>
+          </a:ln>
+          <a:effectLst>
+            <a:outerShdw blurRad="292100" dist="139700" dir="2700000" algn="tl" rotWithShape="0">
+              <a:srgbClr val="333333">
+                <a:alpha val="65000"/>
+              </a:srgbClr>
+            </a:outerShdw>
+          </a:effectLst>
+        </p:spPr>
+      </p:pic>
+      <p:pic>
+        <p:nvPicPr>
+          <p:cNvPr id="5" name="Picture 4">
+            <a:extLst>
+              <a:ext uri="{FF2B5EF4-FFF2-40B4-BE49-F238E27FC236}">
+                <a16:creationId xmlns:a16="http://schemas.microsoft.com/office/drawing/2014/main" id="{AFD4604D-B44E-433B-AA7F-C9B89B971ED7}"/>
+              </a:ext>
+            </a:extLst>
+          </p:cNvPr>
+          <p:cNvPicPr>
+            <a:picLocks noChangeAspect="1"/>
+          </p:cNvPicPr>
+          <p:nvPr/>
+        </p:nvPicPr>
+        <p:blipFill>
+          <a:blip r:embed="rId5"/>
+          <a:stretch>
+            <a:fillRect/>
+          </a:stretch>
+        </p:blipFill>
+        <p:spPr>
+          <a:xfrm>
+            <a:off x="786673" y="2648405"/>
+            <a:ext cx="5057888" cy="2382585"/>
+          </a:xfrm>
+          <a:prstGeom prst="rect">
+            <a:avLst/>
+          </a:prstGeom>
+          <a:ln>
+            <a:noFill/>
+          </a:ln>
+          <a:effectLst>
+            <a:outerShdw blurRad="292100" dist="139700" dir="2700000" algn="tl" rotWithShape="0">
+              <a:srgbClr val="333333">
+                <a:alpha val="65000"/>
+              </a:srgbClr>
+            </a:outerShdw>
+          </a:effectLst>
+        </p:spPr>
+      </p:pic>
+    </p:spTree>
+    <p:extLst>
+      <p:ext uri="{BB962C8B-B14F-4D97-AF65-F5344CB8AC3E}">
+        <p14:creationId xmlns:p14="http://schemas.microsoft.com/office/powerpoint/2010/main" val="3292339799"/>
+      </p:ext>
+    </p:extLst>
+  </p:cSld>
+  <p:clrMapOvr>
+    <a:masterClrMapping/>
+  </p:clrMapOvr>
+</p:sld>
+</file>
+
+<file path=ppt/slides/slide42.xml><?xml version="1.0" encoding="utf-8"?>
 <p:sld xmlns:a="http://schemas.openxmlformats.org/drawingml/2006/main" xmlns:r="http://schemas.openxmlformats.org/officeDocument/2006/relationships" xmlns:p="http://schemas.openxmlformats.org/presentationml/2006/main">
   <p:cSld>
     <p:spTree>
@@ -21391,247 +21531,6 @@
 </p:sld>
 </file>
 
-<file path=ppt/slides/slide42.xml><?xml version="1.0" encoding="utf-8"?>
-<p:sld xmlns:a="http://schemas.openxmlformats.org/drawingml/2006/main" xmlns:r="http://schemas.openxmlformats.org/officeDocument/2006/relationships" xmlns:p="http://schemas.openxmlformats.org/presentationml/2006/main" show="0">
-  <p:cSld>
-    <p:spTree>
-      <p:nvGrpSpPr>
-        <p:cNvPr id="1" name=""/>
-        <p:cNvGrpSpPr/>
-        <p:nvPr/>
-      </p:nvGrpSpPr>
-      <p:grpSpPr>
-        <a:xfrm>
-          <a:off x="0" y="0"/>
-          <a:ext cx="0" cy="0"/>
-          <a:chOff x="0" y="0"/>
-          <a:chExt cx="0" cy="0"/>
-        </a:xfrm>
-      </p:grpSpPr>
-      <p:sp>
-        <p:nvSpPr>
-          <p:cNvPr id="2" name="Rectangle 1">
-            <a:extLst>
-              <a:ext uri="{FF2B5EF4-FFF2-40B4-BE49-F238E27FC236}">
-                <a16:creationId xmlns:a16="http://schemas.microsoft.com/office/drawing/2014/main" id="{A676ED06-08B0-4031-B887-0E4A253B700D}"/>
-              </a:ext>
-            </a:extLst>
-          </p:cNvPr>
-          <p:cNvSpPr/>
-          <p:nvPr/>
-        </p:nvSpPr>
-        <p:spPr>
-          <a:xfrm>
-            <a:off x="1" y="0"/>
-            <a:ext cx="12192000" cy="830179"/>
-          </a:xfrm>
-          <a:prstGeom prst="rect">
-            <a:avLst/>
-          </a:prstGeom>
-          <a:ln>
-            <a:noFill/>
-          </a:ln>
-        </p:spPr>
-        <p:style>
-          <a:lnRef idx="2">
-            <a:schemeClr val="accent1">
-              <a:shade val="50000"/>
-            </a:schemeClr>
-          </a:lnRef>
-          <a:fillRef idx="1">
-            <a:schemeClr val="accent1"/>
-          </a:fillRef>
-          <a:effectRef idx="0">
-            <a:schemeClr val="accent1"/>
-          </a:effectRef>
-          <a:fontRef idx="minor">
-            <a:schemeClr val="lt1"/>
-          </a:fontRef>
-        </p:style>
-        <p:txBody>
-          <a:bodyPr rtlCol="0" anchor="ctr"/>
-          <a:lstStyle/>
-          <a:p>
-            <a:pPr algn="ctr"/>
-            <a:endParaRPr lang="en-US"/>
-          </a:p>
-        </p:txBody>
-      </p:sp>
-      <p:sp>
-        <p:nvSpPr>
-          <p:cNvPr id="7" name="TextBox 6">
-            <a:extLst>
-              <a:ext uri="{FF2B5EF4-FFF2-40B4-BE49-F238E27FC236}">
-                <a16:creationId xmlns:a16="http://schemas.microsoft.com/office/drawing/2014/main" id="{6EA4CFBB-F25E-47BC-BEA0-0C324F8B1A2C}"/>
-              </a:ext>
-            </a:extLst>
-          </p:cNvPr>
-          <p:cNvSpPr txBox="1"/>
-          <p:nvPr/>
-        </p:nvSpPr>
-        <p:spPr>
-          <a:xfrm>
-            <a:off x="381000" y="243235"/>
-            <a:ext cx="8031480" cy="486287"/>
-          </a:xfrm>
-          <a:prstGeom prst="rect">
-            <a:avLst/>
-          </a:prstGeom>
-          <a:noFill/>
-        </p:spPr>
-        <p:txBody>
-          <a:bodyPr wrap="square" rtlCol="0">
-            <a:spAutoFit/>
-          </a:bodyPr>
-          <a:lstStyle/>
-          <a:p>
-            <a:pPr>
-              <a:lnSpc>
-                <a:spcPct val="80000"/>
-              </a:lnSpc>
-            </a:pPr>
-            <a:r>
-              <a:rPr lang="en-US" sz="3200" b="1" dirty="0">
-                <a:solidFill>
-                  <a:schemeClr val="tx2"/>
-                </a:solidFill>
-                <a:latin typeface="Lato Black" panose="020F0502020204030203" pitchFamily="34" charset="0"/>
-                <a:ea typeface="Lato Black" panose="020F0502020204030203" pitchFamily="34" charset="0"/>
-                <a:cs typeface="Lato Black" panose="020F0502020204030203" pitchFamily="34" charset="0"/>
-              </a:rPr>
-              <a:t>HARD(ER) STUFF</a:t>
-            </a:r>
-          </a:p>
-        </p:txBody>
-      </p:sp>
-      <p:sp>
-        <p:nvSpPr>
-          <p:cNvPr id="9" name="TextBox 8">
-            <a:extLst>
-              <a:ext uri="{FF2B5EF4-FFF2-40B4-BE49-F238E27FC236}">
-                <a16:creationId xmlns:a16="http://schemas.microsoft.com/office/drawing/2014/main" id="{B3FDD1E9-A122-435C-B6ED-EC0987A9EF76}"/>
-              </a:ext>
-            </a:extLst>
-          </p:cNvPr>
-          <p:cNvSpPr txBox="1"/>
-          <p:nvPr/>
-        </p:nvSpPr>
-        <p:spPr>
-          <a:xfrm>
-            <a:off x="786673" y="1226765"/>
-            <a:ext cx="7756078" cy="739241"/>
-          </a:xfrm>
-          <a:prstGeom prst="rect">
-            <a:avLst/>
-          </a:prstGeom>
-          <a:noFill/>
-        </p:spPr>
-        <p:txBody>
-          <a:bodyPr wrap="square" rtlCol="0">
-            <a:spAutoFit/>
-          </a:bodyPr>
-          <a:lstStyle/>
-          <a:p>
-            <a:pPr>
-              <a:lnSpc>
-                <a:spcPct val="150000"/>
-              </a:lnSpc>
-            </a:pPr>
-            <a:r>
-              <a:rPr lang="en-US" sz="3200" dirty="0">
-                <a:solidFill>
-                  <a:schemeClr val="tx2"/>
-                </a:solidFill>
-                <a:latin typeface="Lato" panose="020F0502020204030203"/>
-              </a:rPr>
-              <a:t>Comparing Current Period</a:t>
-            </a:r>
-          </a:p>
-        </p:txBody>
-      </p:sp>
-      <p:pic>
-        <p:nvPicPr>
-          <p:cNvPr id="6" name="Picture 5" descr="A picture containing plate&#10;&#10;Description automatically generated">
-            <a:extLst>
-              <a:ext uri="{FF2B5EF4-FFF2-40B4-BE49-F238E27FC236}">
-                <a16:creationId xmlns:a16="http://schemas.microsoft.com/office/drawing/2014/main" id="{ECDF19A4-1B9D-4919-8E18-677130A7249E}"/>
-              </a:ext>
-            </a:extLst>
-          </p:cNvPr>
-          <p:cNvPicPr>
-            <a:picLocks noChangeAspect="1"/>
-          </p:cNvPicPr>
-          <p:nvPr/>
-        </p:nvPicPr>
-        <p:blipFill>
-          <a:blip r:embed="rId3"/>
-          <a:stretch>
-            <a:fillRect/>
-          </a:stretch>
-        </p:blipFill>
-        <p:spPr>
-          <a:xfrm>
-            <a:off x="11567856" y="171945"/>
-            <a:ext cx="486287" cy="486287"/>
-          </a:xfrm>
-          <a:prstGeom prst="rect">
-            <a:avLst/>
-          </a:prstGeom>
-        </p:spPr>
-      </p:pic>
-      <p:pic>
-        <p:nvPicPr>
-          <p:cNvPr id="3" name="Picture 2">
-            <a:extLst>
-              <a:ext uri="{FF2B5EF4-FFF2-40B4-BE49-F238E27FC236}">
-                <a16:creationId xmlns:a16="http://schemas.microsoft.com/office/drawing/2014/main" id="{95201187-DF80-4D08-BA80-1E2BEC4BC55C}"/>
-              </a:ext>
-            </a:extLst>
-          </p:cNvPr>
-          <p:cNvPicPr>
-            <a:picLocks noChangeAspect="1"/>
-          </p:cNvPicPr>
-          <p:nvPr/>
-        </p:nvPicPr>
-        <p:blipFill>
-          <a:blip r:embed="rId4"/>
-          <a:stretch>
-            <a:fillRect/>
-          </a:stretch>
-        </p:blipFill>
-        <p:spPr>
-          <a:xfrm>
-            <a:off x="2986087" y="2362592"/>
-            <a:ext cx="6219825" cy="3600450"/>
-          </a:xfrm>
-          <a:prstGeom prst="rect">
-            <a:avLst/>
-          </a:prstGeom>
-          <a:ln>
-            <a:noFill/>
-          </a:ln>
-          <a:effectLst>
-            <a:outerShdw blurRad="292100" dist="139700" dir="2700000" algn="tl" rotWithShape="0">
-              <a:srgbClr val="333333">
-                <a:alpha val="65000"/>
-              </a:srgbClr>
-            </a:outerShdw>
-          </a:effectLst>
-        </p:spPr>
-      </p:pic>
-    </p:spTree>
-    <p:extLst>
-      <p:ext uri="{BB962C8B-B14F-4D97-AF65-F5344CB8AC3E}">
-        <p14:creationId xmlns:p14="http://schemas.microsoft.com/office/powerpoint/2010/main" val="3306292503"/>
-      </p:ext>
-    </p:extLst>
-  </p:cSld>
-  <p:clrMapOvr>
-    <a:masterClrMapping/>
-  </p:clrMapOvr>
-</p:sld>
-</file>
-
 <file path=ppt/slides/slide43.xml><?xml version="1.0" encoding="utf-8"?>
 <p:sld xmlns:a="http://schemas.openxmlformats.org/drawingml/2006/main" xmlns:r="http://schemas.openxmlformats.org/officeDocument/2006/relationships" xmlns:p="http://schemas.openxmlformats.org/presentationml/2006/main" show="0">
   <p:cSld>
@@ -22133,7 +22032,7 @@
         </p:nvSpPr>
         <p:spPr>
           <a:xfrm>
-            <a:off x="6808369" y="2845119"/>
+            <a:off x="7184555" y="2814933"/>
             <a:ext cx="334028" cy="259491"/>
           </a:xfrm>
           <a:custGeom>
@@ -22276,7 +22175,7 @@
         </p:nvSpPr>
         <p:spPr>
           <a:xfrm>
-            <a:off x="7335654" y="2727650"/>
+            <a:off x="7711840" y="2697464"/>
             <a:ext cx="2829569" cy="494431"/>
           </a:xfrm>
           <a:prstGeom prst="rect">
@@ -22322,7 +22221,7 @@
         </p:nvSpPr>
         <p:spPr>
           <a:xfrm>
-            <a:off x="6823553" y="3438871"/>
+            <a:off x="7199739" y="3408685"/>
             <a:ext cx="303662" cy="255829"/>
           </a:xfrm>
           <a:custGeom>
@@ -22473,8 +22372,8 @@
         </p:nvSpPr>
         <p:spPr>
           <a:xfrm>
-            <a:off x="7335654" y="3339381"/>
-            <a:ext cx="4692308" cy="494431"/>
+            <a:off x="7711840" y="3309195"/>
+            <a:ext cx="4027273" cy="494431"/>
           </a:xfrm>
           <a:prstGeom prst="rect">
             <a:avLst/>
@@ -22528,7 +22427,7 @@
         </p:nvSpPr>
         <p:spPr>
           <a:xfrm>
-            <a:off x="6823553" y="4019713"/>
+            <a:off x="7199739" y="3989527"/>
             <a:ext cx="303661" cy="357229"/>
           </a:xfrm>
           <a:custGeom>
@@ -22674,7 +22573,7 @@
         </p:nvSpPr>
         <p:spPr>
           <a:xfrm>
-            <a:off x="7335654" y="3951113"/>
+            <a:off x="7711840" y="3920927"/>
             <a:ext cx="2829569" cy="494431"/>
           </a:xfrm>
           <a:prstGeom prst="rect">
@@ -22706,73 +22605,6 @@
           </a:p>
         </p:txBody>
       </p:sp>
-      <p:sp>
-        <p:nvSpPr>
-          <p:cNvPr id="2" name="Rectangle 1">
-            <a:extLst>
-              <a:ext uri="{FF2B5EF4-FFF2-40B4-BE49-F238E27FC236}">
-                <a16:creationId xmlns:a16="http://schemas.microsoft.com/office/drawing/2014/main" id="{427152C7-1776-4AE0-B2D1-E07C738DEE83}"/>
-              </a:ext>
-            </a:extLst>
-          </p:cNvPr>
-          <p:cNvSpPr/>
-          <p:nvPr/>
-        </p:nvSpPr>
-        <p:spPr>
-          <a:xfrm>
-            <a:off x="2026777" y="5815171"/>
-            <a:ext cx="8138446" cy="584775"/>
-          </a:xfrm>
-          <a:prstGeom prst="rect">
-            <a:avLst/>
-          </a:prstGeom>
-        </p:spPr>
-        <p:txBody>
-          <a:bodyPr wrap="none">
-            <a:spAutoFit/>
-          </a:bodyPr>
-          <a:lstStyle/>
-          <a:p>
-            <a:r>
-              <a:rPr lang="en-US" sz="3200" dirty="0">
-                <a:hlinkClick r:id="rId4"/>
-              </a:rPr>
-              <a:t>https://github.com/byobi/PBI-Time-Intelligence</a:t>
-            </a:r>
-            <a:endParaRPr lang="en-US" sz="3200" dirty="0"/>
-          </a:p>
-        </p:txBody>
-      </p:sp>
-      <p:pic>
-        <p:nvPicPr>
-          <p:cNvPr id="21" name="Picture 20">
-            <a:extLst>
-              <a:ext uri="{FF2B5EF4-FFF2-40B4-BE49-F238E27FC236}">
-                <a16:creationId xmlns:a16="http://schemas.microsoft.com/office/drawing/2014/main" id="{E7F20B67-4EC6-4513-82E4-BB92B4654081}"/>
-              </a:ext>
-            </a:extLst>
-          </p:cNvPr>
-          <p:cNvPicPr>
-            <a:picLocks noChangeAspect="1"/>
-          </p:cNvPicPr>
-          <p:nvPr/>
-        </p:nvPicPr>
-        <p:blipFill>
-          <a:blip r:embed="rId5"/>
-          <a:stretch>
-            <a:fillRect/>
-          </a:stretch>
-        </p:blipFill>
-        <p:spPr>
-          <a:xfrm>
-            <a:off x="535477" y="2042985"/>
-            <a:ext cx="5832393" cy="3581654"/>
-          </a:xfrm>
-          <a:prstGeom prst="rect">
-            <a:avLst/>
-          </a:prstGeom>
-        </p:spPr>
-      </p:pic>
       <p:grpSp>
         <p:nvGrpSpPr>
           <p:cNvPr id="3" name="Group 2">
@@ -22787,10 +22619,10 @@
         </p:nvGrpSpPr>
         <p:grpSpPr>
           <a:xfrm>
-            <a:off x="2464682" y="263599"/>
-            <a:ext cx="7262636" cy="1403816"/>
+            <a:off x="6298250" y="514976"/>
+            <a:ext cx="5129681" cy="1000911"/>
             <a:chOff x="-153640" y="229944"/>
-            <a:chExt cx="7262636" cy="1403816"/>
+            <a:chExt cx="6475163" cy="1325266"/>
           </a:xfrm>
         </p:grpSpPr>
         <p:sp>
@@ -22801,8 +22633,8 @@
           </p:nvSpPr>
           <p:spPr>
             <a:xfrm>
-              <a:off x="1215026" y="458054"/>
-              <a:ext cx="5893970" cy="1175706"/>
+              <a:off x="1237922" y="454920"/>
+              <a:ext cx="5083601" cy="1100290"/>
             </a:xfrm>
             <a:prstGeom prst="rect">
               <a:avLst/>
@@ -22821,7 +22653,7 @@
                 </a:lnSpc>
               </a:pPr>
               <a:r>
-                <a:rPr lang="en-US" sz="8800" dirty="0">
+                <a:rPr lang="en-US" sz="6000" dirty="0">
                   <a:solidFill>
                     <a:schemeClr val="accent1"/>
                   </a:solidFill>
@@ -22849,7 +22681,7 @@
             <p:nvPr/>
           </p:nvPicPr>
           <p:blipFill>
-            <a:blip r:embed="rId6"/>
+            <a:blip r:embed="rId4"/>
             <a:stretch>
               <a:fillRect/>
             </a:stretch>
@@ -22865,6 +22697,77 @@
           </p:spPr>
         </p:pic>
       </p:grpSp>
+      <p:pic>
+        <p:nvPicPr>
+          <p:cNvPr id="4" name="Picture 3">
+            <a:extLst>
+              <a:ext uri="{FF2B5EF4-FFF2-40B4-BE49-F238E27FC236}">
+                <a16:creationId xmlns:a16="http://schemas.microsoft.com/office/drawing/2014/main" id="{8E5BF4A6-7C6A-4C56-862F-60B4192C8E1B}"/>
+              </a:ext>
+            </a:extLst>
+          </p:cNvPr>
+          <p:cNvPicPr>
+            <a:picLocks noChangeAspect="1"/>
+          </p:cNvPicPr>
+          <p:nvPr/>
+        </p:nvPicPr>
+        <p:blipFill>
+          <a:blip r:embed="rId5"/>
+          <a:stretch>
+            <a:fillRect/>
+          </a:stretch>
+        </p:blipFill>
+        <p:spPr>
+          <a:xfrm>
+            <a:off x="0" y="0"/>
+            <a:ext cx="5559650" cy="6574642"/>
+          </a:xfrm>
+          <a:prstGeom prst="rect">
+            <a:avLst/>
+          </a:prstGeom>
+        </p:spPr>
+      </p:pic>
+      <p:sp>
+        <p:nvSpPr>
+          <p:cNvPr id="2" name="Rectangle 1">
+            <a:extLst>
+              <a:ext uri="{FF2B5EF4-FFF2-40B4-BE49-F238E27FC236}">
+                <a16:creationId xmlns:a16="http://schemas.microsoft.com/office/drawing/2014/main" id="{427152C7-1776-4AE0-B2D1-E07C738DEE83}"/>
+              </a:ext>
+            </a:extLst>
+          </p:cNvPr>
+          <p:cNvSpPr/>
+          <p:nvPr/>
+        </p:nvSpPr>
+        <p:spPr>
+          <a:xfrm>
+            <a:off x="0" y="6198469"/>
+            <a:ext cx="12192000" cy="630942"/>
+          </a:xfrm>
+          <a:prstGeom prst="rect">
+            <a:avLst/>
+          </a:prstGeom>
+          <a:solidFill>
+            <a:schemeClr val="accent2"/>
+          </a:solidFill>
+        </p:spPr>
+        <p:txBody>
+          <a:bodyPr wrap="square">
+            <a:spAutoFit/>
+          </a:bodyPr>
+          <a:lstStyle/>
+          <a:p>
+            <a:pPr algn="ctr"/>
+            <a:r>
+              <a:rPr lang="en-US" sz="3500" dirty="0">
+                <a:hlinkClick r:id="rId6"/>
+              </a:rPr>
+              <a:t>https://github.com/byobi/PBI-Time-Intelligence</a:t>
+            </a:r>
+            <a:endParaRPr lang="en-US" sz="3500" dirty="0"/>
+          </a:p>
+        </p:txBody>
+      </p:sp>
     </p:spTree>
     <p:extLst>
       <p:ext uri="{BB962C8B-B14F-4D97-AF65-F5344CB8AC3E}">
@@ -23532,7 +23435,7 @@
         </p:nvSpPr>
         <p:spPr>
           <a:xfrm>
-            <a:off x="3869931" y="3751363"/>
+            <a:off x="1468562" y="3642644"/>
             <a:ext cx="4452135" cy="1569660"/>
           </a:xfrm>
           <a:prstGeom prst="rect">
@@ -23828,6 +23731,46 @@
           <a:prstGeom prst="rect">
             <a:avLst/>
           </a:prstGeom>
+        </p:spPr>
+      </p:pic>
+      <p:pic>
+        <p:nvPicPr>
+          <p:cNvPr id="3" name="Picture 2">
+            <a:extLst>
+              <a:ext uri="{FF2B5EF4-FFF2-40B4-BE49-F238E27FC236}">
+                <a16:creationId xmlns:a16="http://schemas.microsoft.com/office/drawing/2014/main" id="{533AB161-500F-4DAD-9006-D9382B848783}"/>
+              </a:ext>
+            </a:extLst>
+          </p:cNvPr>
+          <p:cNvPicPr>
+            <a:picLocks noChangeAspect="1"/>
+          </p:cNvPicPr>
+          <p:nvPr/>
+        </p:nvPicPr>
+        <p:blipFill>
+          <a:blip r:embed="rId4"/>
+          <a:stretch>
+            <a:fillRect/>
+          </a:stretch>
+        </p:blipFill>
+        <p:spPr>
+          <a:xfrm>
+            <a:off x="7154858" y="3285419"/>
+            <a:ext cx="2838846" cy="2457793"/>
+          </a:xfrm>
+          <a:prstGeom prst="rect">
+            <a:avLst/>
+          </a:prstGeom>
+          <a:ln>
+            <a:noFill/>
+          </a:ln>
+          <a:effectLst>
+            <a:outerShdw blurRad="292100" dist="139700" dir="2700000" algn="tl" rotWithShape="0">
+              <a:srgbClr val="333333">
+                <a:alpha val="65000"/>
+              </a:srgbClr>
+            </a:outerShdw>
+          </a:effectLst>
         </p:spPr>
       </p:pic>
     </p:spTree>
@@ -24037,57 +23980,6 @@
           </a:p>
         </p:txBody>
       </p:sp>
-      <p:sp>
-        <p:nvSpPr>
-          <p:cNvPr id="8" name="Rectangle 7">
-            <a:extLst>
-              <a:ext uri="{FF2B5EF4-FFF2-40B4-BE49-F238E27FC236}">
-                <a16:creationId xmlns:a16="http://schemas.microsoft.com/office/drawing/2014/main" id="{0FF46BA8-B1B1-4798-81D5-B54C8DC298A8}"/>
-              </a:ext>
-            </a:extLst>
-          </p:cNvPr>
-          <p:cNvSpPr/>
-          <p:nvPr/>
-        </p:nvSpPr>
-        <p:spPr>
-          <a:xfrm>
-            <a:off x="4628867" y="3626734"/>
-            <a:ext cx="2934263" cy="461665"/>
-          </a:xfrm>
-          <a:prstGeom prst="rect">
-            <a:avLst/>
-          </a:prstGeom>
-        </p:spPr>
-        <p:txBody>
-          <a:bodyPr wrap="square">
-            <a:spAutoFit/>
-          </a:bodyPr>
-          <a:lstStyle/>
-          <a:p>
-            <a:r>
-              <a:rPr lang="en-US" sz="2400" dirty="0">
-                <a:solidFill>
-                  <a:srgbClr val="0070FF"/>
-                </a:solidFill>
-                <a:latin typeface="Consolas" panose="020B0609020204030204" pitchFamily="49" charset="0"/>
-              </a:rPr>
-              <a:t>CALENDARAUTO</a:t>
-            </a:r>
-            <a:r>
-              <a:rPr lang="en-US" sz="2400" dirty="0">
-                <a:solidFill>
-                  <a:srgbClr val="969696"/>
-                </a:solidFill>
-                <a:latin typeface="Consolas" panose="020B0609020204030204" pitchFamily="49" charset="0"/>
-              </a:rPr>
-              <a:t> ()</a:t>
-            </a:r>
-            <a:endParaRPr lang="en-US" sz="2400" dirty="0">
-              <a:latin typeface="Consolas" panose="020B0609020204030204" pitchFamily="49" charset="0"/>
-            </a:endParaRPr>
-          </a:p>
-        </p:txBody>
-      </p:sp>
       <p:pic>
         <p:nvPicPr>
           <p:cNvPr id="9" name="Picture 8" descr="A picture containing plate&#10;&#10;Description automatically generated">
@@ -24112,6 +24004,36 @@
           <a:xfrm>
             <a:off x="11567856" y="171945"/>
             <a:ext cx="486287" cy="486287"/>
+          </a:xfrm>
+          <a:prstGeom prst="rect">
+            <a:avLst/>
+          </a:prstGeom>
+        </p:spPr>
+      </p:pic>
+      <p:pic>
+        <p:nvPicPr>
+          <p:cNvPr id="3" name="Picture 2">
+            <a:extLst>
+              <a:ext uri="{FF2B5EF4-FFF2-40B4-BE49-F238E27FC236}">
+                <a16:creationId xmlns:a16="http://schemas.microsoft.com/office/drawing/2014/main" id="{04222DE8-3C22-4B8D-87F9-E7C34B0EB13D}"/>
+              </a:ext>
+            </a:extLst>
+          </p:cNvPr>
+          <p:cNvPicPr>
+            <a:picLocks noChangeAspect="1"/>
+          </p:cNvPicPr>
+          <p:nvPr/>
+        </p:nvPicPr>
+        <p:blipFill>
+          <a:blip r:embed="rId4"/>
+          <a:stretch>
+            <a:fillRect/>
+          </a:stretch>
+        </p:blipFill>
+        <p:spPr>
+          <a:xfrm>
+            <a:off x="4714681" y="3189707"/>
+            <a:ext cx="2762636" cy="2600688"/>
           </a:xfrm>
           <a:prstGeom prst="rect">
             <a:avLst/>
@@ -24723,81 +24645,6 @@
   <p:clrMapOvr>
     <a:masterClrMapping/>
   </p:clrMapOvr>
-  <p:timing>
-    <p:tnLst>
-      <p:par>
-        <p:cTn id="1" dur="indefinite" restart="never" nodeType="tmRoot">
-          <p:childTnLst>
-            <p:seq concurrent="1" nextAc="seek">
-              <p:cTn id="2" dur="indefinite" nodeType="mainSeq">
-                <p:childTnLst>
-                  <p:par>
-                    <p:cTn id="3" fill="hold">
-                      <p:stCondLst>
-                        <p:cond delay="indefinite"/>
-                      </p:stCondLst>
-                      <p:childTnLst>
-                        <p:par>
-                          <p:cTn id="4" fill="hold">
-                            <p:stCondLst>
-                              <p:cond delay="0"/>
-                            </p:stCondLst>
-                            <p:childTnLst>
-                              <p:par>
-                                <p:cTn id="5" presetID="1" presetClass="entr" presetSubtype="0" fill="hold" nodeType="clickEffect">
-                                  <p:stCondLst>
-                                    <p:cond delay="0"/>
-                                  </p:stCondLst>
-                                  <p:childTnLst>
-                                    <p:set>
-                                      <p:cBhvr>
-                                        <p:cTn id="6" dur="1" fill="hold">
-                                          <p:stCondLst>
-                                            <p:cond delay="0"/>
-                                          </p:stCondLst>
-                                        </p:cTn>
-                                        <p:tgtEl>
-                                          <p:spTgt spid="1026"/>
-                                        </p:tgtEl>
-                                        <p:attrNameLst>
-                                          <p:attrName>style.visibility</p:attrName>
-                                        </p:attrNameLst>
-                                      </p:cBhvr>
-                                      <p:to>
-                                        <p:strVal val="visible"/>
-                                      </p:to>
-                                    </p:set>
-                                  </p:childTnLst>
-                                </p:cTn>
-                              </p:par>
-                            </p:childTnLst>
-                          </p:cTn>
-                        </p:par>
-                      </p:childTnLst>
-                    </p:cTn>
-                  </p:par>
-                </p:childTnLst>
-              </p:cTn>
-              <p:prevCondLst>
-                <p:cond evt="onPrev" delay="0">
-                  <p:tgtEl>
-                    <p:sldTgt/>
-                  </p:tgtEl>
-                </p:cond>
-              </p:prevCondLst>
-              <p:nextCondLst>
-                <p:cond evt="onNext" delay="0">
-                  <p:tgtEl>
-                    <p:sldTgt/>
-                  </p:tgtEl>
-                </p:cond>
-              </p:nextCondLst>
-            </p:seq>
-          </p:childTnLst>
-        </p:cTn>
-      </p:par>
-    </p:tnLst>
-  </p:timing>
 </p:sld>
 </file>
 
@@ -25707,6 +25554,14 @@
 </file>
 
 <file path=customXml/item1.xml><?xml version="1.0" encoding="utf-8"?>
+<p:properties xmlns:p="http://schemas.microsoft.com/office/2006/metadata/properties" xmlns:xsi="http://www.w3.org/2001/XMLSchema-instance" xmlns:pc="http://schemas.microsoft.com/office/infopath/2007/PartnerControls">
+  <documentManagement>
+    <MediaServiceKeyPoints xmlns="71af3243-3dd4-4a8d-8c0d-dd76da1f02a5" xsi:nil="true"/>
+  </documentManagement>
+</p:properties>
+</file>
+
+<file path=customXml/item2.xml><?xml version="1.0" encoding="utf-8"?>
 <?mso-contentType ?>
 <FormTemplates xmlns="http://schemas.microsoft.com/sharepoint/v3/contenttype/forms">
   <Display>DocumentLibraryForm</Display>
@@ -25715,7 +25570,7 @@
 </FormTemplates>
 </file>
 
-<file path=customXml/item2.xml><?xml version="1.0" encoding="utf-8"?>
+<file path=customXml/item3.xml><?xml version="1.0" encoding="utf-8"?>
 <ct:contentTypeSchema xmlns:ct="http://schemas.microsoft.com/office/2006/metadata/contentType" xmlns:ma="http://schemas.microsoft.com/office/2006/metadata/properties/metaAttributes" ct:_="" ma:_="" ma:contentTypeName="Document" ma:contentTypeID="0x01010079F111ED35F8CC479449609E8A0923A6" ma:contentTypeVersion="11" ma:contentTypeDescription="Create a new document." ma:contentTypeScope="" ma:versionID="96291512c1ee715ab617f4c07df79fc1">
   <xsd:schema xmlns:xsd="http://www.w3.org/2001/XMLSchema" xmlns:xs="http://www.w3.org/2001/XMLSchema" xmlns:p="http://schemas.microsoft.com/office/2006/metadata/properties" xmlns:ns2="71af3243-3dd4-4a8d-8c0d-dd76da1f02a5" xmlns:ns3="16c05727-aa75-4e4a-9b5f-8a80a1165891" targetNamespace="http://schemas.microsoft.com/office/2006/metadata/properties" ma:root="true" ma:fieldsID="8256c27c40ca5c40ce1cf6c44f0205df" ns2:_="" ns3:_="">
     <xsd:import namespace="71af3243-3dd4-4a8d-8c0d-dd76da1f02a5"/>
@@ -25926,15 +25781,24 @@
 </ct:contentTypeSchema>
 </file>
 
-<file path=customXml/item3.xml><?xml version="1.0" encoding="utf-8"?>
-<p:properties xmlns:p="http://schemas.microsoft.com/office/2006/metadata/properties" xmlns:xsi="http://www.w3.org/2001/XMLSchema-instance" xmlns:pc="http://schemas.microsoft.com/office/infopath/2007/PartnerControls">
-  <documentManagement>
-    <MediaServiceKeyPoints xmlns="71af3243-3dd4-4a8d-8c0d-dd76da1f02a5" xsi:nil="true"/>
-  </documentManagement>
-</p:properties>
+<file path=customXml/itemProps1.xml><?xml version="1.0" encoding="utf-8"?>
+<ds:datastoreItem xmlns:ds="http://schemas.openxmlformats.org/officeDocument/2006/customXml" ds:itemID="{2AC98A6E-22EC-4DD4-9EEB-7896057C12A3}">
+  <ds:schemaRefs>
+    <ds:schemaRef ds:uri="http://schemas.microsoft.com/office/2006/documentManagement/types"/>
+    <ds:schemaRef ds:uri="71af3243-3dd4-4a8d-8c0d-dd76da1f02a5"/>
+    <ds:schemaRef ds:uri="http://www.w3.org/XML/1998/namespace"/>
+    <ds:schemaRef ds:uri="http://purl.org/dc/elements/1.1/"/>
+    <ds:schemaRef ds:uri="http://schemas.openxmlformats.org/package/2006/metadata/core-properties"/>
+    <ds:schemaRef ds:uri="http://schemas.microsoft.com/office/2006/metadata/properties"/>
+    <ds:schemaRef ds:uri="http://purl.org/dc/terms/"/>
+    <ds:schemaRef ds:uri="http://schemas.microsoft.com/office/infopath/2007/PartnerControls"/>
+    <ds:schemaRef ds:uri="16c05727-aa75-4e4a-9b5f-8a80a1165891"/>
+    <ds:schemaRef ds:uri="http://purl.org/dc/dcmitype/"/>
+  </ds:schemaRefs>
+</ds:datastoreItem>
 </file>
 
-<file path=customXml/itemProps1.xml><?xml version="1.0" encoding="utf-8"?>
+<file path=customXml/itemProps2.xml><?xml version="1.0" encoding="utf-8"?>
 <ds:datastoreItem xmlns:ds="http://schemas.openxmlformats.org/officeDocument/2006/customXml" ds:itemID="{CBCEF3AB-10D4-49E3-B75C-776D60141D78}">
   <ds:schemaRefs>
     <ds:schemaRef ds:uri="http://schemas.microsoft.com/sharepoint/v3/contenttype/forms"/>
@@ -25942,7 +25806,7 @@
 </ds:datastoreItem>
 </file>
 
-<file path=customXml/itemProps2.xml><?xml version="1.0" encoding="utf-8"?>
+<file path=customXml/itemProps3.xml><?xml version="1.0" encoding="utf-8"?>
 <ds:datastoreItem xmlns:ds="http://schemas.openxmlformats.org/officeDocument/2006/customXml" ds:itemID="{D3510E7F-70F5-4475-850F-7F9C0A821B3E}">
   <ds:schemaRefs>
     <ds:schemaRef ds:uri="http://schemas.microsoft.com/office/2006/metadata/contentType"/>
@@ -25959,21 +25823,4 @@
     <ds:schemaRef ds:uri="http://schemas.microsoft.com/internal/obd"/>
   </ds:schemaRefs>
 </ds:datastoreItem>
-</file>
-
-<file path=customXml/itemProps3.xml><?xml version="1.0" encoding="utf-8"?>
-<ds:datastoreItem xmlns:ds="http://schemas.openxmlformats.org/officeDocument/2006/customXml" ds:itemID="{2AC98A6E-22EC-4DD4-9EEB-7896057C12A3}">
-  <ds:schemaRefs>
-    <ds:schemaRef ds:uri="http://schemas.microsoft.com/office/2006/documentManagement/types"/>
-    <ds:schemaRef ds:uri="71af3243-3dd4-4a8d-8c0d-dd76da1f02a5"/>
-    <ds:schemaRef ds:uri="http://www.w3.org/XML/1998/namespace"/>
-    <ds:schemaRef ds:uri="http://purl.org/dc/elements/1.1/"/>
-    <ds:schemaRef ds:uri="http://schemas.openxmlformats.org/package/2006/metadata/core-properties"/>
-    <ds:schemaRef ds:uri="http://schemas.microsoft.com/office/2006/metadata/properties"/>
-    <ds:schemaRef ds:uri="http://purl.org/dc/terms/"/>
-    <ds:schemaRef ds:uri="http://schemas.microsoft.com/office/infopath/2007/PartnerControls"/>
-    <ds:schemaRef ds:uri="16c05727-aa75-4e4a-9b5f-8a80a1165891"/>
-    <ds:schemaRef ds:uri="http://purl.org/dc/dcmitype/"/>
-  </ds:schemaRefs>
-</ds:datastoreItem>
 </file>
</xml_diff>